<commit_message>
Extra words about emojis
</commit_message>
<xml_diff>
--- a/bicoded_sentiment_analysis/sentiment_anaysis.pptx
+++ b/bicoded_sentiment_analysis/sentiment_anaysis.pptx
@@ -358,7 +358,7 @@
             <a:fld id="{0B25AC41-3BEC-9247-8322-91B80C013F2D}" type="datetimeFigureOut">
               <a:rPr lang="en-US" smtClean="0"/>
               <a:pPr/>
-              <a:t>12/7/18</a:t>
+              <a:t>12/10/18</a:t>
             </a:fld>
             <a:endParaRPr lang="en-US" dirty="0"/>
           </a:p>
@@ -5352,6 +5352,20 @@
             <a:r>
               <a:rPr lang="en-CA" i="1" dirty="0"/>
               <a:t>Much slower</a:t>
+            </a:r>
+          </a:p>
+          <a:p>
+            <a:pPr marL="1085850" lvl="1" indent="-342900">
+              <a:buFont typeface="Arial" panose="020B0604020202020204" pitchFamily="34" charset="0"/>
+              <a:buChar char="•"/>
+            </a:pPr>
+            <a:r>
+              <a:rPr lang="en-CA" i="1" dirty="0"/>
+              <a:t>Can parse emojis in code points to </a:t>
+            </a:r>
+            <a:r>
+              <a:rPr lang="en-CA" i="1"/>
+              <a:t>some extend</a:t>
             </a:r>
             <a:endParaRPr lang="en-US" dirty="0"/>
           </a:p>
@@ -7810,12 +7824,9 @@
 </file>
 
 <file path=customXml/item1.xml><?xml version="1.0" encoding="utf-8"?>
-<?mso-contentType ?>
-<FormTemplates xmlns="http://schemas.microsoft.com/sharepoint/v3/contenttype/forms">
-  <Display>DocumentLibraryForm</Display>
-  <Edit>DocumentLibraryForm</Edit>
-  <New>DocumentLibraryForm</New>
-</FormTemplates>
+<p:properties xmlns:p="http://schemas.microsoft.com/office/2006/metadata/properties" xmlns:xsi="http://www.w3.org/2001/XMLSchema-instance">
+  <documentManagement/>
+</p:properties>
 </file>
 
 <file path=customXml/item2.xml><?xml version="1.0" encoding="utf-8"?>
@@ -7933,15 +7944,25 @@
 </file>
 
 <file path=customXml/item3.xml><?xml version="1.0" encoding="utf-8"?>
-<p:properties xmlns:p="http://schemas.microsoft.com/office/2006/metadata/properties" xmlns:xsi="http://www.w3.org/2001/XMLSchema-instance">
-  <documentManagement/>
-</p:properties>
+<?mso-contentType ?>
+<FormTemplates xmlns="http://schemas.microsoft.com/sharepoint/v3/contenttype/forms">
+  <Display>DocumentLibraryForm</Display>
+  <Edit>DocumentLibraryForm</Edit>
+  <New>DocumentLibraryForm</New>
+</FormTemplates>
 </file>
 
 <file path=customXml/itemProps1.xml><?xml version="1.0" encoding="utf-8"?>
-<ds:datastoreItem xmlns:ds="http://schemas.openxmlformats.org/officeDocument/2006/customXml" ds:itemID="{705B35A6-8B52-46A5-AE45-B98C6459DC10}">
+<ds:datastoreItem xmlns:ds="http://schemas.openxmlformats.org/officeDocument/2006/customXml" ds:itemID="{C597C89A-FD0C-431E-81F6-90225B937683}">
   <ds:schemaRefs>
-    <ds:schemaRef ds:uri="http://schemas.microsoft.com/sharepoint/v3/contenttype/forms"/>
+    <ds:schemaRef ds:uri="http://schemas.microsoft.com/office/infopath/2007/PartnerControls"/>
+    <ds:schemaRef ds:uri="http://www.w3.org/XML/1998/namespace"/>
+    <ds:schemaRef ds:uri="http://schemas.microsoft.com/office/2006/documentManagement/types"/>
+    <ds:schemaRef ds:uri="http://purl.org/dc/dcmitype/"/>
+    <ds:schemaRef ds:uri="http://schemas.openxmlformats.org/package/2006/metadata/core-properties"/>
+    <ds:schemaRef ds:uri="http://purl.org/dc/terms/"/>
+    <ds:schemaRef ds:uri="http://schemas.microsoft.com/office/2006/metadata/properties"/>
+    <ds:schemaRef ds:uri="http://purl.org/dc/elements/1.1/"/>
   </ds:schemaRefs>
 </ds:datastoreItem>
 </file>
@@ -7963,16 +7984,9 @@
 </file>
 
 <file path=customXml/itemProps3.xml><?xml version="1.0" encoding="utf-8"?>
-<ds:datastoreItem xmlns:ds="http://schemas.openxmlformats.org/officeDocument/2006/customXml" ds:itemID="{C597C89A-FD0C-431E-81F6-90225B937683}">
+<ds:datastoreItem xmlns:ds="http://schemas.openxmlformats.org/officeDocument/2006/customXml" ds:itemID="{705B35A6-8B52-46A5-AE45-B98C6459DC10}">
   <ds:schemaRefs>
-    <ds:schemaRef ds:uri="http://schemas.microsoft.com/office/infopath/2007/PartnerControls"/>
-    <ds:schemaRef ds:uri="http://www.w3.org/XML/1998/namespace"/>
-    <ds:schemaRef ds:uri="http://schemas.microsoft.com/office/2006/documentManagement/types"/>
-    <ds:schemaRef ds:uri="http://purl.org/dc/dcmitype/"/>
-    <ds:schemaRef ds:uri="http://schemas.openxmlformats.org/package/2006/metadata/core-properties"/>
-    <ds:schemaRef ds:uri="http://purl.org/dc/terms/"/>
-    <ds:schemaRef ds:uri="http://schemas.microsoft.com/office/2006/metadata/properties"/>
-    <ds:schemaRef ds:uri="http://purl.org/dc/elements/1.1/"/>
+    <ds:schemaRef ds:uri="http://schemas.microsoft.com/sharepoint/v3/contenttype/forms"/>
   </ds:schemaRefs>
 </ds:datastoreItem>
 </file>
</xml_diff>

<commit_message>
Add full leadership board to slides
</commit_message>
<xml_diff>
--- a/bicoded_sentiment_analysis/sentiment_anaysis.pptx
+++ b/bicoded_sentiment_analysis/sentiment_anaysis.pptx
@@ -6984,7 +6984,12 @@
             <p:ph idx="1"/>
           </p:nvPr>
         </p:nvSpPr>
-        <p:spPr/>
+        <p:spPr>
+          <a:xfrm>
+            <a:off x="340592" y="1009332"/>
+            <a:ext cx="4180608" cy="3553926"/>
+          </a:xfrm>
+        </p:spPr>
         <p:txBody>
           <a:bodyPr/>
           <a:lstStyle/>
@@ -7065,36 +7070,4060 @@
           </a:p>
         </p:txBody>
       </p:sp>
-      <p:pic>
-        <p:nvPicPr>
-          <p:cNvPr id="12" name="Picture 11">
+      <p:graphicFrame>
+        <p:nvGraphicFramePr>
+          <p:cNvPr id="3" name="Table 2">
             <a:extLst>
               <a:ext uri="{FF2B5EF4-FFF2-40B4-BE49-F238E27FC236}">
-                <a16:creationId xmlns:a16="http://schemas.microsoft.com/office/drawing/2014/main" id="{B3D13FC0-9FE4-0147-8F27-67707DA33B7D}"/>
+                <a16:creationId xmlns:a16="http://schemas.microsoft.com/office/drawing/2014/main" id="{B0F2EB34-9DDD-3548-A836-09E2FA04C5DC}"/>
               </a:ext>
             </a:extLst>
           </p:cNvPr>
-          <p:cNvPicPr>
-            <a:picLocks noChangeAspect="1"/>
-          </p:cNvPicPr>
-          <p:nvPr/>
-        </p:nvPicPr>
-        <p:blipFill>
-          <a:blip r:embed="rId2"/>
-          <a:stretch>
-            <a:fillRect/>
-          </a:stretch>
-        </p:blipFill>
-        <p:spPr>
-          <a:xfrm>
-            <a:off x="4439441" y="855133"/>
-            <a:ext cx="4475758" cy="2063750"/>
-          </a:xfrm>
-          <a:prstGeom prst="rect">
-            <a:avLst/>
-          </a:prstGeom>
-        </p:spPr>
-      </p:pic>
+          <p:cNvGraphicFramePr>
+            <a:graphicFrameLocks noGrp="1"/>
+          </p:cNvGraphicFramePr>
+          <p:nvPr>
+            <p:extLst>
+              <p:ext uri="{D42A27DB-BD31-4B8C-83A1-F6EECF244321}">
+                <p14:modId xmlns:p14="http://schemas.microsoft.com/office/powerpoint/2010/main" val="166097754"/>
+              </p:ext>
+            </p:extLst>
+          </p:nvPr>
+        </p:nvGraphicFramePr>
+        <p:xfrm>
+          <a:off x="4521200" y="253121"/>
+          <a:ext cx="4487332" cy="4310132"/>
+        </p:xfrm>
+        <a:graphic>
+          <a:graphicData uri="http://schemas.openxmlformats.org/drawingml/2006/table">
+            <a:tbl>
+              <a:tblPr firstRow="1" firstCol="1" bandRow="1">
+                <a:tableStyleId>{5C22544A-7EE6-4342-B048-85BDC9FD1C3A}</a:tableStyleId>
+              </a:tblPr>
+              <a:tblGrid>
+                <a:gridCol w="1159796">
+                  <a:extLst>
+                    <a:ext uri="{9D8B030D-6E8A-4147-A177-3AD203B41FA5}">
+                      <a16:colId xmlns:a16="http://schemas.microsoft.com/office/drawing/2014/main" val="4103158699"/>
+                    </a:ext>
+                  </a:extLst>
+                </a:gridCol>
+                <a:gridCol w="706991">
+                  <a:extLst>
+                    <a:ext uri="{9D8B030D-6E8A-4147-A177-3AD203B41FA5}">
+                      <a16:colId xmlns:a16="http://schemas.microsoft.com/office/drawing/2014/main" val="364529018"/>
+                    </a:ext>
+                  </a:extLst>
+                </a:gridCol>
+                <a:gridCol w="567244">
+                  <a:extLst>
+                    <a:ext uri="{9D8B030D-6E8A-4147-A177-3AD203B41FA5}">
+                      <a16:colId xmlns:a16="http://schemas.microsoft.com/office/drawing/2014/main" val="2350558299"/>
+                    </a:ext>
+                  </a:extLst>
+                </a:gridCol>
+                <a:gridCol w="471511">
+                  <a:extLst>
+                    <a:ext uri="{9D8B030D-6E8A-4147-A177-3AD203B41FA5}">
+                      <a16:colId xmlns:a16="http://schemas.microsoft.com/office/drawing/2014/main" val="3885851212"/>
+                    </a:ext>
+                  </a:extLst>
+                </a:gridCol>
+                <a:gridCol w="417043">
+                  <a:extLst>
+                    <a:ext uri="{9D8B030D-6E8A-4147-A177-3AD203B41FA5}">
+                      <a16:colId xmlns:a16="http://schemas.microsoft.com/office/drawing/2014/main" val="4066941439"/>
+                    </a:ext>
+                  </a:extLst>
+                </a:gridCol>
+                <a:gridCol w="604105">
+                  <a:extLst>
+                    <a:ext uri="{9D8B030D-6E8A-4147-A177-3AD203B41FA5}">
+                      <a16:colId xmlns:a16="http://schemas.microsoft.com/office/drawing/2014/main" val="2983975786"/>
+                    </a:ext>
+                  </a:extLst>
+                </a:gridCol>
+                <a:gridCol w="560642">
+                  <a:extLst>
+                    <a:ext uri="{9D8B030D-6E8A-4147-A177-3AD203B41FA5}">
+                      <a16:colId xmlns:a16="http://schemas.microsoft.com/office/drawing/2014/main" val="1624538707"/>
+                    </a:ext>
+                  </a:extLst>
+                </a:gridCol>
+              </a:tblGrid>
+              <a:tr h="299944">
+                <a:tc>
+                  <a:txBody>
+                    <a:bodyPr/>
+                    <a:lstStyle/>
+                    <a:p>
+                      <a:pPr algn="ctr">
+                        <a:spcAft>
+                          <a:spcPts val="0"/>
+                        </a:spcAft>
+                      </a:pPr>
+                      <a:r>
+                        <a:rPr lang="en-US" sz="800" kern="0" dirty="0">
+                          <a:effectLst/>
+                        </a:rPr>
+                        <a:t>Team</a:t>
+                      </a:r>
+                      <a:endParaRPr lang="en-CA" sz="700" kern="100" dirty="0">
+                        <a:effectLst/>
+                        <a:latin typeface="DengXian" panose="02010600030101010101" pitchFamily="2" charset="-122"/>
+                        <a:ea typeface="DengXian" panose="02010600030101010101" pitchFamily="2" charset="-122"/>
+                        <a:cs typeface="Times New Roman" panose="02020603050405020304" pitchFamily="18" charset="0"/>
+                      </a:endParaRPr>
+                    </a:p>
+                  </a:txBody>
+                  <a:tcPr marL="46358" marR="46358" marT="0" marB="0" anchor="ctr"/>
+                </a:tc>
+                <a:tc>
+                  <a:txBody>
+                    <a:bodyPr/>
+                    <a:lstStyle/>
+                    <a:p>
+                      <a:pPr algn="ctr">
+                        <a:spcAft>
+                          <a:spcPts val="0"/>
+                        </a:spcAft>
+                      </a:pPr>
+                      <a:r>
+                        <a:rPr lang="en-US" sz="800" kern="0">
+                          <a:effectLst/>
+                        </a:rPr>
+                        <a:t>Happiness</a:t>
+                      </a:r>
+                      <a:endParaRPr lang="en-CA" sz="700" kern="100">
+                        <a:effectLst/>
+                        <a:latin typeface="DengXian" panose="02010600030101010101" pitchFamily="2" charset="-122"/>
+                        <a:ea typeface="DengXian" panose="02010600030101010101" pitchFamily="2" charset="-122"/>
+                        <a:cs typeface="Times New Roman" panose="02020603050405020304" pitchFamily="18" charset="0"/>
+                      </a:endParaRPr>
+                    </a:p>
+                  </a:txBody>
+                  <a:tcPr marL="46358" marR="46358" marT="0" marB="0" anchor="ctr"/>
+                </a:tc>
+                <a:tc>
+                  <a:txBody>
+                    <a:bodyPr/>
+                    <a:lstStyle/>
+                    <a:p>
+                      <a:pPr algn="ctr">
+                        <a:spcAft>
+                          <a:spcPts val="0"/>
+                        </a:spcAft>
+                      </a:pPr>
+                      <a:r>
+                        <a:rPr lang="en-US" sz="800" kern="0">
+                          <a:effectLst/>
+                        </a:rPr>
+                        <a:t>Sadness</a:t>
+                      </a:r>
+                      <a:endParaRPr lang="en-CA" sz="700" kern="100">
+                        <a:effectLst/>
+                        <a:latin typeface="DengXian" panose="02010600030101010101" pitchFamily="2" charset="-122"/>
+                        <a:ea typeface="DengXian" panose="02010600030101010101" pitchFamily="2" charset="-122"/>
+                        <a:cs typeface="Times New Roman" panose="02020603050405020304" pitchFamily="18" charset="0"/>
+                      </a:endParaRPr>
+                    </a:p>
+                  </a:txBody>
+                  <a:tcPr marL="46358" marR="46358" marT="0" marB="0" anchor="ctr"/>
+                </a:tc>
+                <a:tc>
+                  <a:txBody>
+                    <a:bodyPr/>
+                    <a:lstStyle/>
+                    <a:p>
+                      <a:pPr algn="ctr">
+                        <a:spcAft>
+                          <a:spcPts val="0"/>
+                        </a:spcAft>
+                      </a:pPr>
+                      <a:r>
+                        <a:rPr lang="en-US" sz="800" kern="0">
+                          <a:effectLst/>
+                        </a:rPr>
+                        <a:t>Anger</a:t>
+                      </a:r>
+                      <a:endParaRPr lang="en-CA" sz="700" kern="100">
+                        <a:effectLst/>
+                        <a:latin typeface="DengXian" panose="02010600030101010101" pitchFamily="2" charset="-122"/>
+                        <a:ea typeface="DengXian" panose="02010600030101010101" pitchFamily="2" charset="-122"/>
+                        <a:cs typeface="Times New Roman" panose="02020603050405020304" pitchFamily="18" charset="0"/>
+                      </a:endParaRPr>
+                    </a:p>
+                  </a:txBody>
+                  <a:tcPr marL="46358" marR="46358" marT="0" marB="0" anchor="ctr"/>
+                </a:tc>
+                <a:tc>
+                  <a:txBody>
+                    <a:bodyPr/>
+                    <a:lstStyle/>
+                    <a:p>
+                      <a:pPr algn="ctr">
+                        <a:spcAft>
+                          <a:spcPts val="0"/>
+                        </a:spcAft>
+                      </a:pPr>
+                      <a:r>
+                        <a:rPr lang="en-US" sz="800" kern="0">
+                          <a:effectLst/>
+                        </a:rPr>
+                        <a:t>Fear</a:t>
+                      </a:r>
+                      <a:endParaRPr lang="en-CA" sz="700" kern="100">
+                        <a:effectLst/>
+                        <a:latin typeface="DengXian" panose="02010600030101010101" pitchFamily="2" charset="-122"/>
+                        <a:ea typeface="DengXian" panose="02010600030101010101" pitchFamily="2" charset="-122"/>
+                        <a:cs typeface="Times New Roman" panose="02020603050405020304" pitchFamily="18" charset="0"/>
+                      </a:endParaRPr>
+                    </a:p>
+                  </a:txBody>
+                  <a:tcPr marL="46358" marR="46358" marT="0" marB="0" anchor="ctr"/>
+                </a:tc>
+                <a:tc>
+                  <a:txBody>
+                    <a:bodyPr/>
+                    <a:lstStyle/>
+                    <a:p>
+                      <a:pPr algn="ctr">
+                        <a:spcAft>
+                          <a:spcPts val="0"/>
+                        </a:spcAft>
+                      </a:pPr>
+                      <a:r>
+                        <a:rPr lang="en-US" sz="800" kern="0">
+                          <a:effectLst/>
+                        </a:rPr>
+                        <a:t>Surprise</a:t>
+                      </a:r>
+                      <a:endParaRPr lang="en-CA" sz="700" kern="100">
+                        <a:effectLst/>
+                        <a:latin typeface="DengXian" panose="02010600030101010101" pitchFamily="2" charset="-122"/>
+                        <a:ea typeface="DengXian" panose="02010600030101010101" pitchFamily="2" charset="-122"/>
+                        <a:cs typeface="Times New Roman" panose="02020603050405020304" pitchFamily="18" charset="0"/>
+                      </a:endParaRPr>
+                    </a:p>
+                  </a:txBody>
+                  <a:tcPr marL="46358" marR="46358" marT="0" marB="0" anchor="ctr"/>
+                </a:tc>
+                <a:tc>
+                  <a:txBody>
+                    <a:bodyPr/>
+                    <a:lstStyle/>
+                    <a:p>
+                      <a:pPr algn="ctr">
+                        <a:spcAft>
+                          <a:spcPts val="0"/>
+                        </a:spcAft>
+                      </a:pPr>
+                      <a:r>
+                        <a:rPr lang="en-US" sz="800" kern="0">
+                          <a:effectLst/>
+                        </a:rPr>
+                        <a:t>Marco-F1</a:t>
+                      </a:r>
+                      <a:endParaRPr lang="en-CA" sz="700" kern="100">
+                        <a:effectLst/>
+                        <a:latin typeface="DengXian" panose="02010600030101010101" pitchFamily="2" charset="-122"/>
+                        <a:ea typeface="DengXian" panose="02010600030101010101" pitchFamily="2" charset="-122"/>
+                        <a:cs typeface="Times New Roman" panose="02020603050405020304" pitchFamily="18" charset="0"/>
+                      </a:endParaRPr>
+                    </a:p>
+                  </a:txBody>
+                  <a:tcPr marL="46358" marR="46358" marT="0" marB="0" anchor="ctr"/>
+                </a:tc>
+                <a:extLst>
+                  <a:ext uri="{0D108BD9-81ED-4DB2-BD59-A6C34878D82A}">
+                    <a16:rowId xmlns:a16="http://schemas.microsoft.com/office/drawing/2014/main" val="352336889"/>
+                  </a:ext>
+                </a:extLst>
+              </a:tr>
+              <a:tr h="195276">
+                <a:tc>
+                  <a:txBody>
+                    <a:bodyPr/>
+                    <a:lstStyle/>
+                    <a:p>
+                      <a:pPr algn="ctr">
+                        <a:spcAft>
+                          <a:spcPts val="0"/>
+                        </a:spcAft>
+                      </a:pPr>
+                      <a:r>
+                        <a:rPr lang="en-US" sz="800" kern="0">
+                          <a:effectLst/>
+                        </a:rPr>
+                        <a:t>DeepIntell</a:t>
+                      </a:r>
+                      <a:endParaRPr lang="en-CA" sz="700" kern="100">
+                        <a:effectLst/>
+                        <a:latin typeface="DengXian" panose="02010600030101010101" pitchFamily="2" charset="-122"/>
+                        <a:ea typeface="DengXian" panose="02010600030101010101" pitchFamily="2" charset="-122"/>
+                        <a:cs typeface="Times New Roman" panose="02020603050405020304" pitchFamily="18" charset="0"/>
+                      </a:endParaRPr>
+                    </a:p>
+                  </a:txBody>
+                  <a:tcPr marL="46358" marR="46358" marT="0" marB="0" anchor="ctr"/>
+                </a:tc>
+                <a:tc>
+                  <a:txBody>
+                    <a:bodyPr/>
+                    <a:lstStyle/>
+                    <a:p>
+                      <a:pPr algn="ctr">
+                        <a:spcAft>
+                          <a:spcPts val="0"/>
+                        </a:spcAft>
+                      </a:pPr>
+                      <a:r>
+                        <a:rPr lang="en-US" sz="800" kern="0" dirty="0">
+                          <a:effectLst/>
+                        </a:rPr>
+                        <a:t>0.734</a:t>
+                      </a:r>
+                      <a:endParaRPr lang="en-CA" sz="700" kern="100" dirty="0">
+                        <a:effectLst/>
+                        <a:latin typeface="DengXian" panose="02010600030101010101" pitchFamily="2" charset="-122"/>
+                        <a:ea typeface="DengXian" panose="02010600030101010101" pitchFamily="2" charset="-122"/>
+                        <a:cs typeface="Times New Roman" panose="02020603050405020304" pitchFamily="18" charset="0"/>
+                      </a:endParaRPr>
+                    </a:p>
+                  </a:txBody>
+                  <a:tcPr marL="46358" marR="46358" marT="0" marB="0" anchor="ctr"/>
+                </a:tc>
+                <a:tc>
+                  <a:txBody>
+                    <a:bodyPr/>
+                    <a:lstStyle/>
+                    <a:p>
+                      <a:pPr algn="ctr">
+                        <a:spcAft>
+                          <a:spcPts val="0"/>
+                        </a:spcAft>
+                      </a:pPr>
+                      <a:r>
+                        <a:rPr lang="en-US" sz="800" kern="0">
+                          <a:effectLst/>
+                        </a:rPr>
+                        <a:t>0.616</a:t>
+                      </a:r>
+                      <a:endParaRPr lang="en-CA" sz="700" kern="100">
+                        <a:effectLst/>
+                        <a:latin typeface="DengXian" panose="02010600030101010101" pitchFamily="2" charset="-122"/>
+                        <a:ea typeface="DengXian" panose="02010600030101010101" pitchFamily="2" charset="-122"/>
+                        <a:cs typeface="Times New Roman" panose="02020603050405020304" pitchFamily="18" charset="0"/>
+                      </a:endParaRPr>
+                    </a:p>
+                  </a:txBody>
+                  <a:tcPr marL="46358" marR="46358" marT="0" marB="0" anchor="ctr"/>
+                </a:tc>
+                <a:tc>
+                  <a:txBody>
+                    <a:bodyPr/>
+                    <a:lstStyle/>
+                    <a:p>
+                      <a:pPr algn="ctr">
+                        <a:spcAft>
+                          <a:spcPts val="0"/>
+                        </a:spcAft>
+                      </a:pPr>
+                      <a:r>
+                        <a:rPr lang="en-US" sz="800" kern="0">
+                          <a:effectLst/>
+                        </a:rPr>
+                        <a:t>0.543</a:t>
+                      </a:r>
+                      <a:endParaRPr lang="en-CA" sz="700" kern="100">
+                        <a:effectLst/>
+                        <a:latin typeface="DengXian" panose="02010600030101010101" pitchFamily="2" charset="-122"/>
+                        <a:ea typeface="DengXian" panose="02010600030101010101" pitchFamily="2" charset="-122"/>
+                        <a:cs typeface="Times New Roman" panose="02020603050405020304" pitchFamily="18" charset="0"/>
+                      </a:endParaRPr>
+                    </a:p>
+                  </a:txBody>
+                  <a:tcPr marL="46358" marR="46358" marT="0" marB="0" anchor="ctr"/>
+                </a:tc>
+                <a:tc>
+                  <a:txBody>
+                    <a:bodyPr/>
+                    <a:lstStyle/>
+                    <a:p>
+                      <a:pPr algn="ctr">
+                        <a:spcAft>
+                          <a:spcPts val="0"/>
+                        </a:spcAft>
+                      </a:pPr>
+                      <a:r>
+                        <a:rPr lang="en-US" sz="800" kern="0">
+                          <a:effectLst/>
+                        </a:rPr>
+                        <a:t>0.264</a:t>
+                      </a:r>
+                      <a:endParaRPr lang="en-CA" sz="700" kern="100">
+                        <a:effectLst/>
+                        <a:latin typeface="DengXian" panose="02010600030101010101" pitchFamily="2" charset="-122"/>
+                        <a:ea typeface="DengXian" panose="02010600030101010101" pitchFamily="2" charset="-122"/>
+                        <a:cs typeface="Times New Roman" panose="02020603050405020304" pitchFamily="18" charset="0"/>
+                      </a:endParaRPr>
+                    </a:p>
+                  </a:txBody>
+                  <a:tcPr marL="46358" marR="46358" marT="0" marB="0" anchor="ctr"/>
+                </a:tc>
+                <a:tc>
+                  <a:txBody>
+                    <a:bodyPr/>
+                    <a:lstStyle/>
+                    <a:p>
+                      <a:pPr algn="ctr">
+                        <a:spcAft>
+                          <a:spcPts val="0"/>
+                        </a:spcAft>
+                      </a:pPr>
+                      <a:r>
+                        <a:rPr lang="en-US" sz="800" kern="0">
+                          <a:effectLst/>
+                        </a:rPr>
+                        <a:t>0.418</a:t>
+                      </a:r>
+                      <a:endParaRPr lang="en-CA" sz="700" kern="100">
+                        <a:effectLst/>
+                        <a:latin typeface="DengXian" panose="02010600030101010101" pitchFamily="2" charset="-122"/>
+                        <a:ea typeface="DengXian" panose="02010600030101010101" pitchFamily="2" charset="-122"/>
+                        <a:cs typeface="Times New Roman" panose="02020603050405020304" pitchFamily="18" charset="0"/>
+                      </a:endParaRPr>
+                    </a:p>
+                  </a:txBody>
+                  <a:tcPr marL="46358" marR="46358" marT="0" marB="0" anchor="ctr"/>
+                </a:tc>
+                <a:tc>
+                  <a:txBody>
+                    <a:bodyPr/>
+                    <a:lstStyle/>
+                    <a:p>
+                      <a:pPr algn="ctr">
+                        <a:spcAft>
+                          <a:spcPts val="0"/>
+                        </a:spcAft>
+                      </a:pPr>
+                      <a:r>
+                        <a:rPr lang="en-US" sz="800" kern="0">
+                          <a:effectLst/>
+                        </a:rPr>
+                        <a:t>0.515</a:t>
+                      </a:r>
+                      <a:endParaRPr lang="en-CA" sz="700" kern="100">
+                        <a:effectLst/>
+                        <a:latin typeface="DengXian" panose="02010600030101010101" pitchFamily="2" charset="-122"/>
+                        <a:ea typeface="DengXian" panose="02010600030101010101" pitchFamily="2" charset="-122"/>
+                        <a:cs typeface="Times New Roman" panose="02020603050405020304" pitchFamily="18" charset="0"/>
+                      </a:endParaRPr>
+                    </a:p>
+                  </a:txBody>
+                  <a:tcPr marL="46358" marR="46358" marT="0" marB="0" anchor="ctr"/>
+                </a:tc>
+                <a:extLst>
+                  <a:ext uri="{0D108BD9-81ED-4DB2-BD59-A6C34878D82A}">
+                    <a16:rowId xmlns:a16="http://schemas.microsoft.com/office/drawing/2014/main" val="3377898960"/>
+                  </a:ext>
+                </a:extLst>
+              </a:tr>
+              <a:tr h="195276">
+                <a:tc>
+                  <a:txBody>
+                    <a:bodyPr/>
+                    <a:lstStyle/>
+                    <a:p>
+                      <a:pPr algn="ctr">
+                        <a:spcAft>
+                          <a:spcPts val="0"/>
+                        </a:spcAft>
+                      </a:pPr>
+                      <a:r>
+                        <a:rPr lang="en-US" sz="800" kern="0">
+                          <a:effectLst/>
+                        </a:rPr>
+                        <a:t>DUTIR_938</a:t>
+                      </a:r>
+                      <a:endParaRPr lang="en-CA" sz="700" kern="100">
+                        <a:effectLst/>
+                        <a:latin typeface="DengXian" panose="02010600030101010101" pitchFamily="2" charset="-122"/>
+                        <a:ea typeface="DengXian" panose="02010600030101010101" pitchFamily="2" charset="-122"/>
+                        <a:cs typeface="Times New Roman" panose="02020603050405020304" pitchFamily="18" charset="0"/>
+                      </a:endParaRPr>
+                    </a:p>
+                  </a:txBody>
+                  <a:tcPr marL="46358" marR="46358" marT="0" marB="0" anchor="ctr"/>
+                </a:tc>
+                <a:tc>
+                  <a:txBody>
+                    <a:bodyPr/>
+                    <a:lstStyle/>
+                    <a:p>
+                      <a:pPr algn="ctr">
+                        <a:spcAft>
+                          <a:spcPts val="0"/>
+                        </a:spcAft>
+                      </a:pPr>
+                      <a:r>
+                        <a:rPr lang="en-US" sz="800" kern="0" dirty="0">
+                          <a:effectLst/>
+                        </a:rPr>
+                        <a:t>0.715</a:t>
+                      </a:r>
+                      <a:endParaRPr lang="en-CA" sz="700" kern="100" dirty="0">
+                        <a:effectLst/>
+                        <a:latin typeface="DengXian" panose="02010600030101010101" pitchFamily="2" charset="-122"/>
+                        <a:ea typeface="DengXian" panose="02010600030101010101" pitchFamily="2" charset="-122"/>
+                        <a:cs typeface="Times New Roman" panose="02020603050405020304" pitchFamily="18" charset="0"/>
+                      </a:endParaRPr>
+                    </a:p>
+                  </a:txBody>
+                  <a:tcPr marL="46358" marR="46358" marT="0" marB="0" anchor="ctr"/>
+                </a:tc>
+                <a:tc>
+                  <a:txBody>
+                    <a:bodyPr/>
+                    <a:lstStyle/>
+                    <a:p>
+                      <a:pPr algn="ctr">
+                        <a:spcAft>
+                          <a:spcPts val="0"/>
+                        </a:spcAft>
+                      </a:pPr>
+                      <a:r>
+                        <a:rPr lang="en-US" sz="800" kern="0">
+                          <a:effectLst/>
+                        </a:rPr>
+                        <a:t>0.521</a:t>
+                      </a:r>
+                      <a:endParaRPr lang="en-CA" sz="700" kern="100">
+                        <a:effectLst/>
+                        <a:latin typeface="DengXian" panose="02010600030101010101" pitchFamily="2" charset="-122"/>
+                        <a:ea typeface="DengXian" panose="02010600030101010101" pitchFamily="2" charset="-122"/>
+                        <a:cs typeface="Times New Roman" panose="02020603050405020304" pitchFamily="18" charset="0"/>
+                      </a:endParaRPr>
+                    </a:p>
+                  </a:txBody>
+                  <a:tcPr marL="46358" marR="46358" marT="0" marB="0" anchor="ctr"/>
+                </a:tc>
+                <a:tc>
+                  <a:txBody>
+                    <a:bodyPr/>
+                    <a:lstStyle/>
+                    <a:p>
+                      <a:pPr algn="ctr">
+                        <a:spcAft>
+                          <a:spcPts val="0"/>
+                        </a:spcAft>
+                      </a:pPr>
+                      <a:r>
+                        <a:rPr lang="en-US" sz="800" kern="0">
+                          <a:effectLst/>
+                        </a:rPr>
+                        <a:t>0.541</a:t>
+                      </a:r>
+                      <a:endParaRPr lang="en-CA" sz="700" kern="100">
+                        <a:effectLst/>
+                        <a:latin typeface="DengXian" panose="02010600030101010101" pitchFamily="2" charset="-122"/>
+                        <a:ea typeface="DengXian" panose="02010600030101010101" pitchFamily="2" charset="-122"/>
+                        <a:cs typeface="Times New Roman" panose="02020603050405020304" pitchFamily="18" charset="0"/>
+                      </a:endParaRPr>
+                    </a:p>
+                  </a:txBody>
+                  <a:tcPr marL="46358" marR="46358" marT="0" marB="0" anchor="ctr"/>
+                </a:tc>
+                <a:tc>
+                  <a:txBody>
+                    <a:bodyPr/>
+                    <a:lstStyle/>
+                    <a:p>
+                      <a:pPr algn="ctr">
+                        <a:spcAft>
+                          <a:spcPts val="0"/>
+                        </a:spcAft>
+                      </a:pPr>
+                      <a:r>
+                        <a:rPr lang="en-US" sz="800" kern="0">
+                          <a:effectLst/>
+                        </a:rPr>
+                        <a:t>0.166</a:t>
+                      </a:r>
+                      <a:endParaRPr lang="en-CA" sz="700" kern="100">
+                        <a:effectLst/>
+                        <a:latin typeface="DengXian" panose="02010600030101010101" pitchFamily="2" charset="-122"/>
+                        <a:ea typeface="DengXian" panose="02010600030101010101" pitchFamily="2" charset="-122"/>
+                        <a:cs typeface="Times New Roman" panose="02020603050405020304" pitchFamily="18" charset="0"/>
+                      </a:endParaRPr>
+                    </a:p>
+                  </a:txBody>
+                  <a:tcPr marL="46358" marR="46358" marT="0" marB="0" anchor="ctr"/>
+                </a:tc>
+                <a:tc>
+                  <a:txBody>
+                    <a:bodyPr/>
+                    <a:lstStyle/>
+                    <a:p>
+                      <a:pPr algn="ctr">
+                        <a:spcAft>
+                          <a:spcPts val="0"/>
+                        </a:spcAft>
+                      </a:pPr>
+                      <a:r>
+                        <a:rPr lang="en-US" sz="800" kern="0">
+                          <a:effectLst/>
+                        </a:rPr>
+                        <a:t>0.396</a:t>
+                      </a:r>
+                      <a:endParaRPr lang="en-CA" sz="700" kern="100">
+                        <a:effectLst/>
+                        <a:latin typeface="DengXian" panose="02010600030101010101" pitchFamily="2" charset="-122"/>
+                        <a:ea typeface="DengXian" panose="02010600030101010101" pitchFamily="2" charset="-122"/>
+                        <a:cs typeface="Times New Roman" panose="02020603050405020304" pitchFamily="18" charset="0"/>
+                      </a:endParaRPr>
+                    </a:p>
+                  </a:txBody>
+                  <a:tcPr marL="46358" marR="46358" marT="0" marB="0" anchor="ctr"/>
+                </a:tc>
+                <a:tc>
+                  <a:txBody>
+                    <a:bodyPr/>
+                    <a:lstStyle/>
+                    <a:p>
+                      <a:pPr algn="ctr">
+                        <a:spcAft>
+                          <a:spcPts val="0"/>
+                        </a:spcAft>
+                      </a:pPr>
+                      <a:r>
+                        <a:rPr lang="en-US" sz="800" kern="0">
+                          <a:effectLst/>
+                        </a:rPr>
+                        <a:t>0.468</a:t>
+                      </a:r>
+                      <a:endParaRPr lang="en-CA" sz="700" kern="100">
+                        <a:effectLst/>
+                        <a:latin typeface="DengXian" panose="02010600030101010101" pitchFamily="2" charset="-122"/>
+                        <a:ea typeface="DengXian" panose="02010600030101010101" pitchFamily="2" charset="-122"/>
+                        <a:cs typeface="Times New Roman" panose="02020603050405020304" pitchFamily="18" charset="0"/>
+                      </a:endParaRPr>
+                    </a:p>
+                  </a:txBody>
+                  <a:tcPr marL="46358" marR="46358" marT="0" marB="0" anchor="ctr"/>
+                </a:tc>
+                <a:extLst>
+                  <a:ext uri="{0D108BD9-81ED-4DB2-BD59-A6C34878D82A}">
+                    <a16:rowId xmlns:a16="http://schemas.microsoft.com/office/drawing/2014/main" val="3002035478"/>
+                  </a:ext>
+                </a:extLst>
+              </a:tr>
+              <a:tr h="195276">
+                <a:tc>
+                  <a:txBody>
+                    <a:bodyPr/>
+                    <a:lstStyle/>
+                    <a:p>
+                      <a:pPr algn="ctr">
+                        <a:spcAft>
+                          <a:spcPts val="0"/>
+                        </a:spcAft>
+                      </a:pPr>
+                      <a:r>
+                        <a:rPr lang="en-US" sz="800" kern="0">
+                          <a:effectLst/>
+                        </a:rPr>
+                        <a:t>Shining</a:t>
+                      </a:r>
+                      <a:endParaRPr lang="en-CA" sz="700" kern="100">
+                        <a:effectLst/>
+                        <a:latin typeface="DengXian" panose="02010600030101010101" pitchFamily="2" charset="-122"/>
+                        <a:ea typeface="DengXian" panose="02010600030101010101" pitchFamily="2" charset="-122"/>
+                        <a:cs typeface="Times New Roman" panose="02020603050405020304" pitchFamily="18" charset="0"/>
+                      </a:endParaRPr>
+                    </a:p>
+                  </a:txBody>
+                  <a:tcPr marL="46358" marR="46358" marT="0" marB="0" anchor="ctr"/>
+                </a:tc>
+                <a:tc>
+                  <a:txBody>
+                    <a:bodyPr/>
+                    <a:lstStyle/>
+                    <a:p>
+                      <a:pPr algn="ctr">
+                        <a:spcAft>
+                          <a:spcPts val="0"/>
+                        </a:spcAft>
+                      </a:pPr>
+                      <a:r>
+                        <a:rPr lang="en-US" sz="800" kern="0">
+                          <a:effectLst/>
+                        </a:rPr>
+                        <a:t>0.710</a:t>
+                      </a:r>
+                      <a:endParaRPr lang="en-CA" sz="700" kern="100">
+                        <a:effectLst/>
+                        <a:latin typeface="DengXian" panose="02010600030101010101" pitchFamily="2" charset="-122"/>
+                        <a:ea typeface="DengXian" panose="02010600030101010101" pitchFamily="2" charset="-122"/>
+                        <a:cs typeface="Times New Roman" panose="02020603050405020304" pitchFamily="18" charset="0"/>
+                      </a:endParaRPr>
+                    </a:p>
+                  </a:txBody>
+                  <a:tcPr marL="46358" marR="46358" marT="0" marB="0" anchor="ctr"/>
+                </a:tc>
+                <a:tc>
+                  <a:txBody>
+                    <a:bodyPr/>
+                    <a:lstStyle/>
+                    <a:p>
+                      <a:pPr algn="ctr">
+                        <a:spcAft>
+                          <a:spcPts val="0"/>
+                        </a:spcAft>
+                      </a:pPr>
+                      <a:r>
+                        <a:rPr lang="en-US" sz="800" kern="0">
+                          <a:effectLst/>
+                        </a:rPr>
+                        <a:t>0.652</a:t>
+                      </a:r>
+                      <a:endParaRPr lang="en-CA" sz="700" kern="100">
+                        <a:effectLst/>
+                        <a:latin typeface="DengXian" panose="02010600030101010101" pitchFamily="2" charset="-122"/>
+                        <a:ea typeface="DengXian" panose="02010600030101010101" pitchFamily="2" charset="-122"/>
+                        <a:cs typeface="Times New Roman" panose="02020603050405020304" pitchFamily="18" charset="0"/>
+                      </a:endParaRPr>
+                    </a:p>
+                  </a:txBody>
+                  <a:tcPr marL="46358" marR="46358" marT="0" marB="0" anchor="ctr"/>
+                </a:tc>
+                <a:tc>
+                  <a:txBody>
+                    <a:bodyPr/>
+                    <a:lstStyle/>
+                    <a:p>
+                      <a:pPr algn="ctr">
+                        <a:spcAft>
+                          <a:spcPts val="0"/>
+                        </a:spcAft>
+                      </a:pPr>
+                      <a:r>
+                        <a:rPr lang="en-US" sz="800" kern="0">
+                          <a:effectLst/>
+                        </a:rPr>
+                        <a:t>0.540</a:t>
+                      </a:r>
+                      <a:endParaRPr lang="en-CA" sz="700" kern="100">
+                        <a:effectLst/>
+                        <a:latin typeface="DengXian" panose="02010600030101010101" pitchFamily="2" charset="-122"/>
+                        <a:ea typeface="DengXian" panose="02010600030101010101" pitchFamily="2" charset="-122"/>
+                        <a:cs typeface="Times New Roman" panose="02020603050405020304" pitchFamily="18" charset="0"/>
+                      </a:endParaRPr>
+                    </a:p>
+                  </a:txBody>
+                  <a:tcPr marL="46358" marR="46358" marT="0" marB="0" anchor="ctr"/>
+                </a:tc>
+                <a:tc>
+                  <a:txBody>
+                    <a:bodyPr/>
+                    <a:lstStyle/>
+                    <a:p>
+                      <a:pPr algn="ctr">
+                        <a:spcAft>
+                          <a:spcPts val="0"/>
+                        </a:spcAft>
+                      </a:pPr>
+                      <a:r>
+                        <a:rPr lang="en-US" sz="800" kern="0">
+                          <a:effectLst/>
+                        </a:rPr>
+                        <a:t>0.292</a:t>
+                      </a:r>
+                      <a:endParaRPr lang="en-CA" sz="700" kern="100">
+                        <a:effectLst/>
+                        <a:latin typeface="DengXian" panose="02010600030101010101" pitchFamily="2" charset="-122"/>
+                        <a:ea typeface="DengXian" panose="02010600030101010101" pitchFamily="2" charset="-122"/>
+                        <a:cs typeface="Times New Roman" panose="02020603050405020304" pitchFamily="18" charset="0"/>
+                      </a:endParaRPr>
+                    </a:p>
+                  </a:txBody>
+                  <a:tcPr marL="46358" marR="46358" marT="0" marB="0" anchor="ctr"/>
+                </a:tc>
+                <a:tc>
+                  <a:txBody>
+                    <a:bodyPr/>
+                    <a:lstStyle/>
+                    <a:p>
+                      <a:pPr algn="ctr">
+                        <a:spcAft>
+                          <a:spcPts val="0"/>
+                        </a:spcAft>
+                      </a:pPr>
+                      <a:r>
+                        <a:rPr lang="en-US" sz="800" kern="0">
+                          <a:effectLst/>
+                        </a:rPr>
+                        <a:t>0.139</a:t>
+                      </a:r>
+                      <a:endParaRPr lang="en-CA" sz="700" kern="100">
+                        <a:effectLst/>
+                        <a:latin typeface="DengXian" panose="02010600030101010101" pitchFamily="2" charset="-122"/>
+                        <a:ea typeface="DengXian" panose="02010600030101010101" pitchFamily="2" charset="-122"/>
+                        <a:cs typeface="Times New Roman" panose="02020603050405020304" pitchFamily="18" charset="0"/>
+                      </a:endParaRPr>
+                    </a:p>
+                  </a:txBody>
+                  <a:tcPr marL="46358" marR="46358" marT="0" marB="0" anchor="ctr"/>
+                </a:tc>
+                <a:tc>
+                  <a:txBody>
+                    <a:bodyPr/>
+                    <a:lstStyle/>
+                    <a:p>
+                      <a:pPr algn="ctr">
+                        <a:spcAft>
+                          <a:spcPts val="0"/>
+                        </a:spcAft>
+                      </a:pPr>
+                      <a:r>
+                        <a:rPr lang="en-US" sz="800" kern="0">
+                          <a:effectLst/>
+                        </a:rPr>
+                        <a:t>0.467</a:t>
+                      </a:r>
+                      <a:endParaRPr lang="en-CA" sz="700" kern="100">
+                        <a:effectLst/>
+                        <a:latin typeface="DengXian" panose="02010600030101010101" pitchFamily="2" charset="-122"/>
+                        <a:ea typeface="DengXian" panose="02010600030101010101" pitchFamily="2" charset="-122"/>
+                        <a:cs typeface="Times New Roman" panose="02020603050405020304" pitchFamily="18" charset="0"/>
+                      </a:endParaRPr>
+                    </a:p>
+                  </a:txBody>
+                  <a:tcPr marL="46358" marR="46358" marT="0" marB="0" anchor="ctr"/>
+                </a:tc>
+                <a:extLst>
+                  <a:ext uri="{0D108BD9-81ED-4DB2-BD59-A6C34878D82A}">
+                    <a16:rowId xmlns:a16="http://schemas.microsoft.com/office/drawing/2014/main" val="5715086"/>
+                  </a:ext>
+                </a:extLst>
+              </a:tr>
+              <a:tr h="195276">
+                <a:tc>
+                  <a:txBody>
+                    <a:bodyPr/>
+                    <a:lstStyle/>
+                    <a:p>
+                      <a:pPr algn="ctr">
+                        <a:spcAft>
+                          <a:spcPts val="0"/>
+                        </a:spcAft>
+                      </a:pPr>
+                      <a:r>
+                        <a:rPr lang="en-US" sz="800" kern="0">
+                          <a:effectLst/>
+                        </a:rPr>
+                        <a:t>lxzlx624</a:t>
+                      </a:r>
+                      <a:endParaRPr lang="en-CA" sz="700" kern="100">
+                        <a:effectLst/>
+                        <a:latin typeface="DengXian" panose="02010600030101010101" pitchFamily="2" charset="-122"/>
+                        <a:ea typeface="DengXian" panose="02010600030101010101" pitchFamily="2" charset="-122"/>
+                        <a:cs typeface="Times New Roman" panose="02020603050405020304" pitchFamily="18" charset="0"/>
+                      </a:endParaRPr>
+                    </a:p>
+                  </a:txBody>
+                  <a:tcPr marL="46358" marR="46358" marT="0" marB="0" anchor="ctr"/>
+                </a:tc>
+                <a:tc>
+                  <a:txBody>
+                    <a:bodyPr/>
+                    <a:lstStyle/>
+                    <a:p>
+                      <a:pPr algn="ctr">
+                        <a:spcAft>
+                          <a:spcPts val="0"/>
+                        </a:spcAft>
+                      </a:pPr>
+                      <a:r>
+                        <a:rPr lang="en-US" sz="800" kern="0">
+                          <a:effectLst/>
+                        </a:rPr>
+                        <a:t>0.734</a:t>
+                      </a:r>
+                      <a:endParaRPr lang="en-CA" sz="700" kern="100">
+                        <a:effectLst/>
+                        <a:latin typeface="DengXian" panose="02010600030101010101" pitchFamily="2" charset="-122"/>
+                        <a:ea typeface="DengXian" panose="02010600030101010101" pitchFamily="2" charset="-122"/>
+                        <a:cs typeface="Times New Roman" panose="02020603050405020304" pitchFamily="18" charset="0"/>
+                      </a:endParaRPr>
+                    </a:p>
+                  </a:txBody>
+                  <a:tcPr marL="46358" marR="46358" marT="0" marB="0" anchor="ctr"/>
+                </a:tc>
+                <a:tc>
+                  <a:txBody>
+                    <a:bodyPr/>
+                    <a:lstStyle/>
+                    <a:p>
+                      <a:pPr algn="ctr">
+                        <a:spcAft>
+                          <a:spcPts val="0"/>
+                        </a:spcAft>
+                      </a:pPr>
+                      <a:r>
+                        <a:rPr lang="en-US" sz="800" kern="0" dirty="0">
+                          <a:effectLst/>
+                        </a:rPr>
+                        <a:t>0.637</a:t>
+                      </a:r>
+                      <a:endParaRPr lang="en-CA" sz="700" kern="100" dirty="0">
+                        <a:effectLst/>
+                        <a:latin typeface="DengXian" panose="02010600030101010101" pitchFamily="2" charset="-122"/>
+                        <a:ea typeface="DengXian" panose="02010600030101010101" pitchFamily="2" charset="-122"/>
+                        <a:cs typeface="Times New Roman" panose="02020603050405020304" pitchFamily="18" charset="0"/>
+                      </a:endParaRPr>
+                    </a:p>
+                  </a:txBody>
+                  <a:tcPr marL="46358" marR="46358" marT="0" marB="0" anchor="ctr"/>
+                </a:tc>
+                <a:tc>
+                  <a:txBody>
+                    <a:bodyPr/>
+                    <a:lstStyle/>
+                    <a:p>
+                      <a:pPr algn="ctr">
+                        <a:spcAft>
+                          <a:spcPts val="0"/>
+                        </a:spcAft>
+                      </a:pPr>
+                      <a:r>
+                        <a:rPr lang="en-US" sz="800" kern="0">
+                          <a:effectLst/>
+                        </a:rPr>
+                        <a:t>0.570</a:t>
+                      </a:r>
+                      <a:endParaRPr lang="en-CA" sz="700" kern="100">
+                        <a:effectLst/>
+                        <a:latin typeface="DengXian" panose="02010600030101010101" pitchFamily="2" charset="-122"/>
+                        <a:ea typeface="DengXian" panose="02010600030101010101" pitchFamily="2" charset="-122"/>
+                        <a:cs typeface="Times New Roman" panose="02020603050405020304" pitchFamily="18" charset="0"/>
+                      </a:endParaRPr>
+                    </a:p>
+                  </a:txBody>
+                  <a:tcPr marL="46358" marR="46358" marT="0" marB="0" anchor="ctr"/>
+                </a:tc>
+                <a:tc>
+                  <a:txBody>
+                    <a:bodyPr/>
+                    <a:lstStyle/>
+                    <a:p>
+                      <a:pPr algn="ctr">
+                        <a:spcAft>
+                          <a:spcPts val="0"/>
+                        </a:spcAft>
+                      </a:pPr>
+                      <a:r>
+                        <a:rPr lang="en-US" sz="800" kern="0">
+                          <a:effectLst/>
+                        </a:rPr>
+                        <a:t>0.204</a:t>
+                      </a:r>
+                      <a:endParaRPr lang="en-CA" sz="700" kern="100">
+                        <a:effectLst/>
+                        <a:latin typeface="DengXian" panose="02010600030101010101" pitchFamily="2" charset="-122"/>
+                        <a:ea typeface="DengXian" panose="02010600030101010101" pitchFamily="2" charset="-122"/>
+                        <a:cs typeface="Times New Roman" panose="02020603050405020304" pitchFamily="18" charset="0"/>
+                      </a:endParaRPr>
+                    </a:p>
+                  </a:txBody>
+                  <a:tcPr marL="46358" marR="46358" marT="0" marB="0" anchor="ctr"/>
+                </a:tc>
+                <a:tc>
+                  <a:txBody>
+                    <a:bodyPr/>
+                    <a:lstStyle/>
+                    <a:p>
+                      <a:pPr algn="ctr">
+                        <a:spcAft>
+                          <a:spcPts val="0"/>
+                        </a:spcAft>
+                      </a:pPr>
+                      <a:r>
+                        <a:rPr lang="en-US" sz="800" kern="0">
+                          <a:effectLst/>
+                        </a:rPr>
+                        <a:t>0.164</a:t>
+                      </a:r>
+                      <a:endParaRPr lang="en-CA" sz="700" kern="100">
+                        <a:effectLst/>
+                        <a:latin typeface="DengXian" panose="02010600030101010101" pitchFamily="2" charset="-122"/>
+                        <a:ea typeface="DengXian" panose="02010600030101010101" pitchFamily="2" charset="-122"/>
+                        <a:cs typeface="Times New Roman" panose="02020603050405020304" pitchFamily="18" charset="0"/>
+                      </a:endParaRPr>
+                    </a:p>
+                  </a:txBody>
+                  <a:tcPr marL="46358" marR="46358" marT="0" marB="0" anchor="ctr"/>
+                </a:tc>
+                <a:tc>
+                  <a:txBody>
+                    <a:bodyPr/>
+                    <a:lstStyle/>
+                    <a:p>
+                      <a:pPr algn="ctr">
+                        <a:spcAft>
+                          <a:spcPts val="0"/>
+                        </a:spcAft>
+                      </a:pPr>
+                      <a:r>
+                        <a:rPr lang="en-US" sz="800" kern="0">
+                          <a:effectLst/>
+                        </a:rPr>
+                        <a:t>0.462</a:t>
+                      </a:r>
+                      <a:endParaRPr lang="en-CA" sz="700" kern="100">
+                        <a:effectLst/>
+                        <a:latin typeface="DengXian" panose="02010600030101010101" pitchFamily="2" charset="-122"/>
+                        <a:ea typeface="DengXian" panose="02010600030101010101" pitchFamily="2" charset="-122"/>
+                        <a:cs typeface="Times New Roman" panose="02020603050405020304" pitchFamily="18" charset="0"/>
+                      </a:endParaRPr>
+                    </a:p>
+                  </a:txBody>
+                  <a:tcPr marL="46358" marR="46358" marT="0" marB="0" anchor="ctr"/>
+                </a:tc>
+                <a:extLst>
+                  <a:ext uri="{0D108BD9-81ED-4DB2-BD59-A6C34878D82A}">
+                    <a16:rowId xmlns:a16="http://schemas.microsoft.com/office/drawing/2014/main" val="3858993821"/>
+                  </a:ext>
+                </a:extLst>
+              </a:tr>
+              <a:tr h="195276">
+                <a:tc>
+                  <a:txBody>
+                    <a:bodyPr/>
+                    <a:lstStyle/>
+                    <a:p>
+                      <a:pPr algn="ctr">
+                        <a:spcAft>
+                          <a:spcPts val="0"/>
+                        </a:spcAft>
+                      </a:pPr>
+                      <a:r>
+                        <a:rPr lang="en-US" sz="800" kern="0">
+                          <a:effectLst/>
+                        </a:rPr>
+                        <a:t>xiamx-rali</a:t>
+                      </a:r>
+                      <a:endParaRPr lang="en-CA" sz="700" kern="100">
+                        <a:effectLst/>
+                        <a:latin typeface="DengXian" panose="02010600030101010101" pitchFamily="2" charset="-122"/>
+                        <a:ea typeface="DengXian" panose="02010600030101010101" pitchFamily="2" charset="-122"/>
+                        <a:cs typeface="Times New Roman" panose="02020603050405020304" pitchFamily="18" charset="0"/>
+                      </a:endParaRPr>
+                    </a:p>
+                  </a:txBody>
+                  <a:tcPr marL="46358" marR="46358" marT="0" marB="0" anchor="ctr"/>
+                </a:tc>
+                <a:tc>
+                  <a:txBody>
+                    <a:bodyPr/>
+                    <a:lstStyle/>
+                    <a:p>
+                      <a:pPr algn="ctr">
+                        <a:spcAft>
+                          <a:spcPts val="0"/>
+                        </a:spcAft>
+                      </a:pPr>
+                      <a:r>
+                        <a:rPr lang="en-US" sz="800" kern="0">
+                          <a:effectLst/>
+                        </a:rPr>
+                        <a:t>0.624</a:t>
+                      </a:r>
+                      <a:endParaRPr lang="en-CA" sz="700" kern="100">
+                        <a:effectLst/>
+                        <a:latin typeface="DengXian" panose="02010600030101010101" pitchFamily="2" charset="-122"/>
+                        <a:ea typeface="DengXian" panose="02010600030101010101" pitchFamily="2" charset="-122"/>
+                        <a:cs typeface="Times New Roman" panose="02020603050405020304" pitchFamily="18" charset="0"/>
+                      </a:endParaRPr>
+                    </a:p>
+                  </a:txBody>
+                  <a:tcPr marL="46358" marR="46358" marT="0" marB="0" anchor="ctr"/>
+                </a:tc>
+                <a:tc>
+                  <a:txBody>
+                    <a:bodyPr/>
+                    <a:lstStyle/>
+                    <a:p>
+                      <a:pPr algn="ctr">
+                        <a:spcAft>
+                          <a:spcPts val="0"/>
+                        </a:spcAft>
+                      </a:pPr>
+                      <a:r>
+                        <a:rPr lang="en-US" sz="800" kern="0">
+                          <a:effectLst/>
+                        </a:rPr>
+                        <a:t>0.494</a:t>
+                      </a:r>
+                      <a:endParaRPr lang="en-CA" sz="700" kern="100">
+                        <a:effectLst/>
+                        <a:latin typeface="DengXian" panose="02010600030101010101" pitchFamily="2" charset="-122"/>
+                        <a:ea typeface="DengXian" panose="02010600030101010101" pitchFamily="2" charset="-122"/>
+                        <a:cs typeface="Times New Roman" panose="02020603050405020304" pitchFamily="18" charset="0"/>
+                      </a:endParaRPr>
+                    </a:p>
+                  </a:txBody>
+                  <a:tcPr marL="46358" marR="46358" marT="0" marB="0" anchor="ctr"/>
+                </a:tc>
+                <a:tc>
+                  <a:txBody>
+                    <a:bodyPr/>
+                    <a:lstStyle/>
+                    <a:p>
+                      <a:pPr algn="ctr">
+                        <a:spcAft>
+                          <a:spcPts val="0"/>
+                        </a:spcAft>
+                      </a:pPr>
+                      <a:r>
+                        <a:rPr lang="en-US" sz="800" kern="0">
+                          <a:effectLst/>
+                        </a:rPr>
+                        <a:t>0.457</a:t>
+                      </a:r>
+                      <a:endParaRPr lang="en-CA" sz="700" kern="100">
+                        <a:effectLst/>
+                        <a:latin typeface="DengXian" panose="02010600030101010101" pitchFamily="2" charset="-122"/>
+                        <a:ea typeface="DengXian" panose="02010600030101010101" pitchFamily="2" charset="-122"/>
+                        <a:cs typeface="Times New Roman" panose="02020603050405020304" pitchFamily="18" charset="0"/>
+                      </a:endParaRPr>
+                    </a:p>
+                  </a:txBody>
+                  <a:tcPr marL="46358" marR="46358" marT="0" marB="0" anchor="ctr"/>
+                </a:tc>
+                <a:tc>
+                  <a:txBody>
+                    <a:bodyPr/>
+                    <a:lstStyle/>
+                    <a:p>
+                      <a:pPr algn="ctr">
+                        <a:spcAft>
+                          <a:spcPts val="0"/>
+                        </a:spcAft>
+                      </a:pPr>
+                      <a:r>
+                        <a:rPr lang="en-US" sz="800" kern="0">
+                          <a:effectLst/>
+                        </a:rPr>
+                        <a:t>0.200</a:t>
+                      </a:r>
+                      <a:endParaRPr lang="en-CA" sz="700" kern="100">
+                        <a:effectLst/>
+                        <a:latin typeface="DengXian" panose="02010600030101010101" pitchFamily="2" charset="-122"/>
+                        <a:ea typeface="DengXian" panose="02010600030101010101" pitchFamily="2" charset="-122"/>
+                        <a:cs typeface="Times New Roman" panose="02020603050405020304" pitchFamily="18" charset="0"/>
+                      </a:endParaRPr>
+                    </a:p>
+                  </a:txBody>
+                  <a:tcPr marL="46358" marR="46358" marT="0" marB="0" anchor="ctr"/>
+                </a:tc>
+                <a:tc>
+                  <a:txBody>
+                    <a:bodyPr/>
+                    <a:lstStyle/>
+                    <a:p>
+                      <a:pPr algn="ctr">
+                        <a:spcAft>
+                          <a:spcPts val="0"/>
+                        </a:spcAft>
+                      </a:pPr>
+                      <a:r>
+                        <a:rPr lang="en-US" sz="800" kern="0">
+                          <a:effectLst/>
+                        </a:rPr>
+                        <a:t>0.366</a:t>
+                      </a:r>
+                      <a:endParaRPr lang="en-CA" sz="700" kern="100">
+                        <a:effectLst/>
+                        <a:latin typeface="DengXian" panose="02010600030101010101" pitchFamily="2" charset="-122"/>
+                        <a:ea typeface="DengXian" panose="02010600030101010101" pitchFamily="2" charset="-122"/>
+                        <a:cs typeface="Times New Roman" panose="02020603050405020304" pitchFamily="18" charset="0"/>
+                      </a:endParaRPr>
+                    </a:p>
+                  </a:txBody>
+                  <a:tcPr marL="46358" marR="46358" marT="0" marB="0" anchor="ctr"/>
+                </a:tc>
+                <a:tc>
+                  <a:txBody>
+                    <a:bodyPr/>
+                    <a:lstStyle/>
+                    <a:p>
+                      <a:pPr algn="ctr">
+                        <a:spcAft>
+                          <a:spcPts val="0"/>
+                        </a:spcAft>
+                      </a:pPr>
+                      <a:r>
+                        <a:rPr lang="en-US" sz="800" kern="0">
+                          <a:effectLst/>
+                        </a:rPr>
+                        <a:t>0.428</a:t>
+                      </a:r>
+                      <a:endParaRPr lang="en-CA" sz="700" kern="100">
+                        <a:effectLst/>
+                        <a:latin typeface="DengXian" panose="02010600030101010101" pitchFamily="2" charset="-122"/>
+                        <a:ea typeface="DengXian" panose="02010600030101010101" pitchFamily="2" charset="-122"/>
+                        <a:cs typeface="Times New Roman" panose="02020603050405020304" pitchFamily="18" charset="0"/>
+                      </a:endParaRPr>
+                    </a:p>
+                  </a:txBody>
+                  <a:tcPr marL="46358" marR="46358" marT="0" marB="0" anchor="ctr"/>
+                </a:tc>
+                <a:extLst>
+                  <a:ext uri="{0D108BD9-81ED-4DB2-BD59-A6C34878D82A}">
+                    <a16:rowId xmlns:a16="http://schemas.microsoft.com/office/drawing/2014/main" val="1688367689"/>
+                  </a:ext>
+                </a:extLst>
+              </a:tr>
+              <a:tr h="195276">
+                <a:tc>
+                  <a:txBody>
+                    <a:bodyPr/>
+                    <a:lstStyle/>
+                    <a:p>
+                      <a:pPr algn="ctr">
+                        <a:spcAft>
+                          <a:spcPts val="0"/>
+                        </a:spcAft>
+                      </a:pPr>
+                      <a:r>
+                        <a:rPr lang="en-US" sz="800" kern="0">
+                          <a:effectLst/>
+                        </a:rPr>
+                        <a:t>zzuhhjx</a:t>
+                      </a:r>
+                      <a:endParaRPr lang="en-CA" sz="700" kern="100">
+                        <a:effectLst/>
+                        <a:latin typeface="DengXian" panose="02010600030101010101" pitchFamily="2" charset="-122"/>
+                        <a:ea typeface="DengXian" panose="02010600030101010101" pitchFamily="2" charset="-122"/>
+                        <a:cs typeface="Times New Roman" panose="02020603050405020304" pitchFamily="18" charset="0"/>
+                      </a:endParaRPr>
+                    </a:p>
+                  </a:txBody>
+                  <a:tcPr marL="46358" marR="46358" marT="0" marB="0" anchor="ctr"/>
+                </a:tc>
+                <a:tc>
+                  <a:txBody>
+                    <a:bodyPr/>
+                    <a:lstStyle/>
+                    <a:p>
+                      <a:pPr algn="ctr">
+                        <a:spcAft>
+                          <a:spcPts val="0"/>
+                        </a:spcAft>
+                      </a:pPr>
+                      <a:r>
+                        <a:rPr lang="en-US" sz="800" kern="0">
+                          <a:effectLst/>
+                        </a:rPr>
+                        <a:t>0.692</a:t>
+                      </a:r>
+                      <a:endParaRPr lang="en-CA" sz="700" kern="100">
+                        <a:effectLst/>
+                        <a:latin typeface="DengXian" panose="02010600030101010101" pitchFamily="2" charset="-122"/>
+                        <a:ea typeface="DengXian" panose="02010600030101010101" pitchFamily="2" charset="-122"/>
+                        <a:cs typeface="Times New Roman" panose="02020603050405020304" pitchFamily="18" charset="0"/>
+                      </a:endParaRPr>
+                    </a:p>
+                  </a:txBody>
+                  <a:tcPr marL="46358" marR="46358" marT="0" marB="0" anchor="ctr"/>
+                </a:tc>
+                <a:tc>
+                  <a:txBody>
+                    <a:bodyPr/>
+                    <a:lstStyle/>
+                    <a:p>
+                      <a:pPr algn="ctr">
+                        <a:spcAft>
+                          <a:spcPts val="0"/>
+                        </a:spcAft>
+                      </a:pPr>
+                      <a:r>
+                        <a:rPr lang="en-US" sz="800" kern="0">
+                          <a:effectLst/>
+                        </a:rPr>
+                        <a:t>0.428</a:t>
+                      </a:r>
+                      <a:endParaRPr lang="en-CA" sz="700" kern="100">
+                        <a:effectLst/>
+                        <a:latin typeface="DengXian" panose="02010600030101010101" pitchFamily="2" charset="-122"/>
+                        <a:ea typeface="DengXian" panose="02010600030101010101" pitchFamily="2" charset="-122"/>
+                        <a:cs typeface="Times New Roman" panose="02020603050405020304" pitchFamily="18" charset="0"/>
+                      </a:endParaRPr>
+                    </a:p>
+                  </a:txBody>
+                  <a:tcPr marL="46358" marR="46358" marT="0" marB="0" anchor="ctr"/>
+                </a:tc>
+                <a:tc>
+                  <a:txBody>
+                    <a:bodyPr/>
+                    <a:lstStyle/>
+                    <a:p>
+                      <a:pPr algn="ctr">
+                        <a:spcAft>
+                          <a:spcPts val="0"/>
+                        </a:spcAft>
+                      </a:pPr>
+                      <a:r>
+                        <a:rPr lang="en-US" sz="800" kern="0">
+                          <a:effectLst/>
+                        </a:rPr>
+                        <a:t>0.406</a:t>
+                      </a:r>
+                      <a:endParaRPr lang="en-CA" sz="700" kern="100">
+                        <a:effectLst/>
+                        <a:latin typeface="DengXian" panose="02010600030101010101" pitchFamily="2" charset="-122"/>
+                        <a:ea typeface="DengXian" panose="02010600030101010101" pitchFamily="2" charset="-122"/>
+                        <a:cs typeface="Times New Roman" panose="02020603050405020304" pitchFamily="18" charset="0"/>
+                      </a:endParaRPr>
+                    </a:p>
+                  </a:txBody>
+                  <a:tcPr marL="46358" marR="46358" marT="0" marB="0" anchor="ctr"/>
+                </a:tc>
+                <a:tc>
+                  <a:txBody>
+                    <a:bodyPr/>
+                    <a:lstStyle/>
+                    <a:p>
+                      <a:pPr algn="ctr">
+                        <a:spcAft>
+                          <a:spcPts val="0"/>
+                        </a:spcAft>
+                      </a:pPr>
+                      <a:r>
+                        <a:rPr lang="en-US" sz="800" kern="0">
+                          <a:effectLst/>
+                        </a:rPr>
+                        <a:t>0.186</a:t>
+                      </a:r>
+                      <a:endParaRPr lang="en-CA" sz="700" kern="100">
+                        <a:effectLst/>
+                        <a:latin typeface="DengXian" panose="02010600030101010101" pitchFamily="2" charset="-122"/>
+                        <a:ea typeface="DengXian" panose="02010600030101010101" pitchFamily="2" charset="-122"/>
+                        <a:cs typeface="Times New Roman" panose="02020603050405020304" pitchFamily="18" charset="0"/>
+                      </a:endParaRPr>
+                    </a:p>
+                  </a:txBody>
+                  <a:tcPr marL="46358" marR="46358" marT="0" marB="0" anchor="ctr"/>
+                </a:tc>
+                <a:tc>
+                  <a:txBody>
+                    <a:bodyPr/>
+                    <a:lstStyle/>
+                    <a:p>
+                      <a:pPr algn="ctr">
+                        <a:spcAft>
+                          <a:spcPts val="0"/>
+                        </a:spcAft>
+                      </a:pPr>
+                      <a:r>
+                        <a:rPr lang="en-US" sz="800" kern="0">
+                          <a:effectLst/>
+                        </a:rPr>
+                        <a:t>0.376</a:t>
+                      </a:r>
+                      <a:endParaRPr lang="en-CA" sz="700" kern="100">
+                        <a:effectLst/>
+                        <a:latin typeface="DengXian" panose="02010600030101010101" pitchFamily="2" charset="-122"/>
+                        <a:ea typeface="DengXian" panose="02010600030101010101" pitchFamily="2" charset="-122"/>
+                        <a:cs typeface="Times New Roman" panose="02020603050405020304" pitchFamily="18" charset="0"/>
+                      </a:endParaRPr>
+                    </a:p>
+                  </a:txBody>
+                  <a:tcPr marL="46358" marR="46358" marT="0" marB="0" anchor="ctr"/>
+                </a:tc>
+                <a:tc>
+                  <a:txBody>
+                    <a:bodyPr/>
+                    <a:lstStyle/>
+                    <a:p>
+                      <a:pPr algn="ctr">
+                        <a:spcAft>
+                          <a:spcPts val="0"/>
+                        </a:spcAft>
+                      </a:pPr>
+                      <a:r>
+                        <a:rPr lang="en-US" sz="800" kern="0">
+                          <a:effectLst/>
+                        </a:rPr>
+                        <a:t>0.418</a:t>
+                      </a:r>
+                      <a:endParaRPr lang="en-CA" sz="700" kern="100">
+                        <a:effectLst/>
+                        <a:latin typeface="DengXian" panose="02010600030101010101" pitchFamily="2" charset="-122"/>
+                        <a:ea typeface="DengXian" panose="02010600030101010101" pitchFamily="2" charset="-122"/>
+                        <a:cs typeface="Times New Roman" panose="02020603050405020304" pitchFamily="18" charset="0"/>
+                      </a:endParaRPr>
+                    </a:p>
+                  </a:txBody>
+                  <a:tcPr marL="46358" marR="46358" marT="0" marB="0" anchor="ctr"/>
+                </a:tc>
+                <a:extLst>
+                  <a:ext uri="{0D108BD9-81ED-4DB2-BD59-A6C34878D82A}">
+                    <a16:rowId xmlns:a16="http://schemas.microsoft.com/office/drawing/2014/main" val="2145078151"/>
+                  </a:ext>
+                </a:extLst>
+              </a:tr>
+              <a:tr h="195276">
+                <a:tc>
+                  <a:txBody>
+                    <a:bodyPr/>
+                    <a:lstStyle/>
+                    <a:p>
+                      <a:pPr algn="ctr">
+                        <a:spcAft>
+                          <a:spcPts val="0"/>
+                        </a:spcAft>
+                      </a:pPr>
+                      <a:r>
+                        <a:rPr lang="en-US" sz="800" kern="0">
+                          <a:effectLst/>
+                        </a:rPr>
+                        <a:t>Team_1</a:t>
+                      </a:r>
+                      <a:endParaRPr lang="en-CA" sz="700" kern="100">
+                        <a:effectLst/>
+                        <a:latin typeface="DengXian" panose="02010600030101010101" pitchFamily="2" charset="-122"/>
+                        <a:ea typeface="DengXian" panose="02010600030101010101" pitchFamily="2" charset="-122"/>
+                        <a:cs typeface="Times New Roman" panose="02020603050405020304" pitchFamily="18" charset="0"/>
+                      </a:endParaRPr>
+                    </a:p>
+                  </a:txBody>
+                  <a:tcPr marL="46358" marR="46358" marT="0" marB="0" anchor="ctr"/>
+                </a:tc>
+                <a:tc>
+                  <a:txBody>
+                    <a:bodyPr/>
+                    <a:lstStyle/>
+                    <a:p>
+                      <a:pPr algn="ctr">
+                        <a:spcAft>
+                          <a:spcPts val="0"/>
+                        </a:spcAft>
+                      </a:pPr>
+                      <a:r>
+                        <a:rPr lang="en-US" sz="800" kern="0">
+                          <a:effectLst/>
+                        </a:rPr>
+                        <a:t>0.594</a:t>
+                      </a:r>
+                      <a:endParaRPr lang="en-CA" sz="700" kern="100">
+                        <a:effectLst/>
+                        <a:latin typeface="DengXian" panose="02010600030101010101" pitchFamily="2" charset="-122"/>
+                        <a:ea typeface="DengXian" panose="02010600030101010101" pitchFamily="2" charset="-122"/>
+                        <a:cs typeface="Times New Roman" panose="02020603050405020304" pitchFamily="18" charset="0"/>
+                      </a:endParaRPr>
+                    </a:p>
+                  </a:txBody>
+                  <a:tcPr marL="46358" marR="46358" marT="0" marB="0" anchor="ctr"/>
+                </a:tc>
+                <a:tc>
+                  <a:txBody>
+                    <a:bodyPr/>
+                    <a:lstStyle/>
+                    <a:p>
+                      <a:pPr algn="ctr">
+                        <a:spcAft>
+                          <a:spcPts val="0"/>
+                        </a:spcAft>
+                      </a:pPr>
+                      <a:r>
+                        <a:rPr lang="en-US" sz="800" kern="0">
+                          <a:effectLst/>
+                        </a:rPr>
+                        <a:t>0.510</a:t>
+                      </a:r>
+                      <a:endParaRPr lang="en-CA" sz="700" kern="100">
+                        <a:effectLst/>
+                        <a:latin typeface="DengXian" panose="02010600030101010101" pitchFamily="2" charset="-122"/>
+                        <a:ea typeface="DengXian" panose="02010600030101010101" pitchFamily="2" charset="-122"/>
+                        <a:cs typeface="Times New Roman" panose="02020603050405020304" pitchFamily="18" charset="0"/>
+                      </a:endParaRPr>
+                    </a:p>
+                  </a:txBody>
+                  <a:tcPr marL="46358" marR="46358" marT="0" marB="0" anchor="ctr"/>
+                </a:tc>
+                <a:tc>
+                  <a:txBody>
+                    <a:bodyPr/>
+                    <a:lstStyle/>
+                    <a:p>
+                      <a:pPr algn="ctr">
+                        <a:spcAft>
+                          <a:spcPts val="0"/>
+                        </a:spcAft>
+                      </a:pPr>
+                      <a:r>
+                        <a:rPr lang="en-US" sz="800" kern="0">
+                          <a:effectLst/>
+                        </a:rPr>
+                        <a:t>0.440</a:t>
+                      </a:r>
+                      <a:endParaRPr lang="en-CA" sz="700" kern="100">
+                        <a:effectLst/>
+                        <a:latin typeface="DengXian" panose="02010600030101010101" pitchFamily="2" charset="-122"/>
+                        <a:ea typeface="DengXian" panose="02010600030101010101" pitchFamily="2" charset="-122"/>
+                        <a:cs typeface="Times New Roman" panose="02020603050405020304" pitchFamily="18" charset="0"/>
+                      </a:endParaRPr>
+                    </a:p>
+                  </a:txBody>
+                  <a:tcPr marL="46358" marR="46358" marT="0" marB="0" anchor="ctr"/>
+                </a:tc>
+                <a:tc>
+                  <a:txBody>
+                    <a:bodyPr/>
+                    <a:lstStyle/>
+                    <a:p>
+                      <a:pPr algn="ctr">
+                        <a:spcAft>
+                          <a:spcPts val="0"/>
+                        </a:spcAft>
+                      </a:pPr>
+                      <a:r>
+                        <a:rPr lang="en-US" sz="800" kern="0">
+                          <a:effectLst/>
+                        </a:rPr>
+                        <a:t>0.143</a:t>
+                      </a:r>
+                      <a:endParaRPr lang="en-CA" sz="700" kern="100">
+                        <a:effectLst/>
+                        <a:latin typeface="DengXian" panose="02010600030101010101" pitchFamily="2" charset="-122"/>
+                        <a:ea typeface="DengXian" panose="02010600030101010101" pitchFamily="2" charset="-122"/>
+                        <a:cs typeface="Times New Roman" panose="02020603050405020304" pitchFamily="18" charset="0"/>
+                      </a:endParaRPr>
+                    </a:p>
+                  </a:txBody>
+                  <a:tcPr marL="46358" marR="46358" marT="0" marB="0" anchor="ctr"/>
+                </a:tc>
+                <a:tc>
+                  <a:txBody>
+                    <a:bodyPr/>
+                    <a:lstStyle/>
+                    <a:p>
+                      <a:pPr algn="ctr">
+                        <a:spcAft>
+                          <a:spcPts val="0"/>
+                        </a:spcAft>
+                      </a:pPr>
+                      <a:r>
+                        <a:rPr lang="en-US" sz="800" kern="0">
+                          <a:effectLst/>
+                        </a:rPr>
+                        <a:t>0.310</a:t>
+                      </a:r>
+                      <a:endParaRPr lang="en-CA" sz="700" kern="100">
+                        <a:effectLst/>
+                        <a:latin typeface="DengXian" panose="02010600030101010101" pitchFamily="2" charset="-122"/>
+                        <a:ea typeface="DengXian" panose="02010600030101010101" pitchFamily="2" charset="-122"/>
+                        <a:cs typeface="Times New Roman" panose="02020603050405020304" pitchFamily="18" charset="0"/>
+                      </a:endParaRPr>
+                    </a:p>
+                  </a:txBody>
+                  <a:tcPr marL="46358" marR="46358" marT="0" marB="0" anchor="ctr"/>
+                </a:tc>
+                <a:tc>
+                  <a:txBody>
+                    <a:bodyPr/>
+                    <a:lstStyle/>
+                    <a:p>
+                      <a:pPr algn="ctr">
+                        <a:spcAft>
+                          <a:spcPts val="0"/>
+                        </a:spcAft>
+                      </a:pPr>
+                      <a:r>
+                        <a:rPr lang="en-US" sz="800" kern="0">
+                          <a:effectLst/>
+                        </a:rPr>
+                        <a:t>0.399</a:t>
+                      </a:r>
+                      <a:endParaRPr lang="en-CA" sz="700" kern="100">
+                        <a:effectLst/>
+                        <a:latin typeface="DengXian" panose="02010600030101010101" pitchFamily="2" charset="-122"/>
+                        <a:ea typeface="DengXian" panose="02010600030101010101" pitchFamily="2" charset="-122"/>
+                        <a:cs typeface="Times New Roman" panose="02020603050405020304" pitchFamily="18" charset="0"/>
+                      </a:endParaRPr>
+                    </a:p>
+                  </a:txBody>
+                  <a:tcPr marL="46358" marR="46358" marT="0" marB="0" anchor="ctr"/>
+                </a:tc>
+                <a:extLst>
+                  <a:ext uri="{0D108BD9-81ED-4DB2-BD59-A6C34878D82A}">
+                    <a16:rowId xmlns:a16="http://schemas.microsoft.com/office/drawing/2014/main" val="1662766573"/>
+                  </a:ext>
+                </a:extLst>
+              </a:tr>
+              <a:tr h="195276">
+                <a:tc>
+                  <a:txBody>
+                    <a:bodyPr/>
+                    <a:lstStyle/>
+                    <a:p>
+                      <a:pPr algn="ctr">
+                        <a:spcAft>
+                          <a:spcPts val="0"/>
+                        </a:spcAft>
+                      </a:pPr>
+                      <a:r>
+                        <a:rPr lang="en-US" sz="800" kern="0">
+                          <a:effectLst/>
+                        </a:rPr>
+                        <a:t>CASIA-ED</a:t>
+                      </a:r>
+                      <a:endParaRPr lang="en-CA" sz="700" kern="100">
+                        <a:effectLst/>
+                        <a:latin typeface="DengXian" panose="02010600030101010101" pitchFamily="2" charset="-122"/>
+                        <a:ea typeface="DengXian" panose="02010600030101010101" pitchFamily="2" charset="-122"/>
+                        <a:cs typeface="Times New Roman" panose="02020603050405020304" pitchFamily="18" charset="0"/>
+                      </a:endParaRPr>
+                    </a:p>
+                  </a:txBody>
+                  <a:tcPr marL="46358" marR="46358" marT="0" marB="0" anchor="ctr"/>
+                </a:tc>
+                <a:tc>
+                  <a:txBody>
+                    <a:bodyPr/>
+                    <a:lstStyle/>
+                    <a:p>
+                      <a:pPr algn="ctr">
+                        <a:spcAft>
+                          <a:spcPts val="0"/>
+                        </a:spcAft>
+                      </a:pPr>
+                      <a:r>
+                        <a:rPr lang="en-US" sz="800" kern="0">
+                          <a:effectLst/>
+                        </a:rPr>
+                        <a:t>0.596</a:t>
+                      </a:r>
+                      <a:endParaRPr lang="en-CA" sz="700" kern="100">
+                        <a:effectLst/>
+                        <a:latin typeface="DengXian" panose="02010600030101010101" pitchFamily="2" charset="-122"/>
+                        <a:ea typeface="DengXian" panose="02010600030101010101" pitchFamily="2" charset="-122"/>
+                        <a:cs typeface="Times New Roman" panose="02020603050405020304" pitchFamily="18" charset="0"/>
+                      </a:endParaRPr>
+                    </a:p>
+                  </a:txBody>
+                  <a:tcPr marL="46358" marR="46358" marT="0" marB="0" anchor="ctr"/>
+                </a:tc>
+                <a:tc>
+                  <a:txBody>
+                    <a:bodyPr/>
+                    <a:lstStyle/>
+                    <a:p>
+                      <a:pPr algn="ctr">
+                        <a:spcAft>
+                          <a:spcPts val="0"/>
+                        </a:spcAft>
+                      </a:pPr>
+                      <a:r>
+                        <a:rPr lang="en-US" sz="800" kern="0">
+                          <a:effectLst/>
+                        </a:rPr>
+                        <a:t>0.417</a:t>
+                      </a:r>
+                      <a:endParaRPr lang="en-CA" sz="700" kern="100">
+                        <a:effectLst/>
+                        <a:latin typeface="DengXian" panose="02010600030101010101" pitchFamily="2" charset="-122"/>
+                        <a:ea typeface="DengXian" panose="02010600030101010101" pitchFamily="2" charset="-122"/>
+                        <a:cs typeface="Times New Roman" panose="02020603050405020304" pitchFamily="18" charset="0"/>
+                      </a:endParaRPr>
+                    </a:p>
+                  </a:txBody>
+                  <a:tcPr marL="46358" marR="46358" marT="0" marB="0" anchor="ctr"/>
+                </a:tc>
+                <a:tc>
+                  <a:txBody>
+                    <a:bodyPr/>
+                    <a:lstStyle/>
+                    <a:p>
+                      <a:pPr algn="ctr">
+                        <a:spcAft>
+                          <a:spcPts val="0"/>
+                        </a:spcAft>
+                      </a:pPr>
+                      <a:r>
+                        <a:rPr lang="en-US" sz="800" kern="0" dirty="0">
+                          <a:effectLst/>
+                        </a:rPr>
+                        <a:t>0.510</a:t>
+                      </a:r>
+                      <a:endParaRPr lang="en-CA" sz="700" kern="100" dirty="0">
+                        <a:effectLst/>
+                        <a:latin typeface="DengXian" panose="02010600030101010101" pitchFamily="2" charset="-122"/>
+                        <a:ea typeface="DengXian" panose="02010600030101010101" pitchFamily="2" charset="-122"/>
+                        <a:cs typeface="Times New Roman" panose="02020603050405020304" pitchFamily="18" charset="0"/>
+                      </a:endParaRPr>
+                    </a:p>
+                  </a:txBody>
+                  <a:tcPr marL="46358" marR="46358" marT="0" marB="0" anchor="ctr"/>
+                </a:tc>
+                <a:tc>
+                  <a:txBody>
+                    <a:bodyPr/>
+                    <a:lstStyle/>
+                    <a:p>
+                      <a:pPr algn="ctr">
+                        <a:spcAft>
+                          <a:spcPts val="0"/>
+                        </a:spcAft>
+                      </a:pPr>
+                      <a:r>
+                        <a:rPr lang="en-US" sz="800" kern="0">
+                          <a:effectLst/>
+                        </a:rPr>
+                        <a:t>0.130</a:t>
+                      </a:r>
+                      <a:endParaRPr lang="en-CA" sz="700" kern="100">
+                        <a:effectLst/>
+                        <a:latin typeface="DengXian" panose="02010600030101010101" pitchFamily="2" charset="-122"/>
+                        <a:ea typeface="DengXian" panose="02010600030101010101" pitchFamily="2" charset="-122"/>
+                        <a:cs typeface="Times New Roman" panose="02020603050405020304" pitchFamily="18" charset="0"/>
+                      </a:endParaRPr>
+                    </a:p>
+                  </a:txBody>
+                  <a:tcPr marL="46358" marR="46358" marT="0" marB="0" anchor="ctr"/>
+                </a:tc>
+                <a:tc>
+                  <a:txBody>
+                    <a:bodyPr/>
+                    <a:lstStyle/>
+                    <a:p>
+                      <a:pPr algn="ctr">
+                        <a:spcAft>
+                          <a:spcPts val="0"/>
+                        </a:spcAft>
+                      </a:pPr>
+                      <a:r>
+                        <a:rPr lang="en-US" sz="800" kern="0">
+                          <a:effectLst/>
+                        </a:rPr>
+                        <a:t>0.337</a:t>
+                      </a:r>
+                      <a:endParaRPr lang="en-CA" sz="700" kern="100">
+                        <a:effectLst/>
+                        <a:latin typeface="DengXian" panose="02010600030101010101" pitchFamily="2" charset="-122"/>
+                        <a:ea typeface="DengXian" panose="02010600030101010101" pitchFamily="2" charset="-122"/>
+                        <a:cs typeface="Times New Roman" panose="02020603050405020304" pitchFamily="18" charset="0"/>
+                      </a:endParaRPr>
+                    </a:p>
+                  </a:txBody>
+                  <a:tcPr marL="46358" marR="46358" marT="0" marB="0" anchor="ctr"/>
+                </a:tc>
+                <a:tc>
+                  <a:txBody>
+                    <a:bodyPr/>
+                    <a:lstStyle/>
+                    <a:p>
+                      <a:pPr algn="ctr">
+                        <a:spcAft>
+                          <a:spcPts val="0"/>
+                        </a:spcAft>
+                      </a:pPr>
+                      <a:r>
+                        <a:rPr lang="en-US" sz="800" kern="0">
+                          <a:effectLst/>
+                        </a:rPr>
+                        <a:t>0.398</a:t>
+                      </a:r>
+                      <a:endParaRPr lang="en-CA" sz="700" kern="100">
+                        <a:effectLst/>
+                        <a:latin typeface="DengXian" panose="02010600030101010101" pitchFamily="2" charset="-122"/>
+                        <a:ea typeface="DengXian" panose="02010600030101010101" pitchFamily="2" charset="-122"/>
+                        <a:cs typeface="Times New Roman" panose="02020603050405020304" pitchFamily="18" charset="0"/>
+                      </a:endParaRPr>
+                    </a:p>
+                  </a:txBody>
+                  <a:tcPr marL="46358" marR="46358" marT="0" marB="0" anchor="ctr"/>
+                </a:tc>
+                <a:extLst>
+                  <a:ext uri="{0D108BD9-81ED-4DB2-BD59-A6C34878D82A}">
+                    <a16:rowId xmlns:a16="http://schemas.microsoft.com/office/drawing/2014/main" val="360793121"/>
+                  </a:ext>
+                </a:extLst>
+              </a:tr>
+              <a:tr h="195276">
+                <a:tc>
+                  <a:txBody>
+                    <a:bodyPr/>
+                    <a:lstStyle/>
+                    <a:p>
+                      <a:pPr algn="ctr">
+                        <a:spcAft>
+                          <a:spcPts val="0"/>
+                        </a:spcAft>
+                      </a:pPr>
+                      <a:r>
+                        <a:rPr lang="en-US" sz="800" kern="0">
+                          <a:effectLst/>
+                        </a:rPr>
+                        <a:t>cmos_nlp</a:t>
+                      </a:r>
+                      <a:endParaRPr lang="en-CA" sz="700" kern="100">
+                        <a:effectLst/>
+                        <a:latin typeface="DengXian" panose="02010600030101010101" pitchFamily="2" charset="-122"/>
+                        <a:ea typeface="DengXian" panose="02010600030101010101" pitchFamily="2" charset="-122"/>
+                        <a:cs typeface="Times New Roman" panose="02020603050405020304" pitchFamily="18" charset="0"/>
+                      </a:endParaRPr>
+                    </a:p>
+                  </a:txBody>
+                  <a:tcPr marL="46358" marR="46358" marT="0" marB="0" anchor="ctr"/>
+                </a:tc>
+                <a:tc>
+                  <a:txBody>
+                    <a:bodyPr/>
+                    <a:lstStyle/>
+                    <a:p>
+                      <a:pPr algn="ctr">
+                        <a:spcAft>
+                          <a:spcPts val="0"/>
+                        </a:spcAft>
+                      </a:pPr>
+                      <a:r>
+                        <a:rPr lang="en-US" sz="800" kern="0">
+                          <a:effectLst/>
+                        </a:rPr>
+                        <a:t>0.632</a:t>
+                      </a:r>
+                      <a:endParaRPr lang="en-CA" sz="700" kern="100">
+                        <a:effectLst/>
+                        <a:latin typeface="DengXian" panose="02010600030101010101" pitchFamily="2" charset="-122"/>
+                        <a:ea typeface="DengXian" panose="02010600030101010101" pitchFamily="2" charset="-122"/>
+                        <a:cs typeface="Times New Roman" panose="02020603050405020304" pitchFamily="18" charset="0"/>
+                      </a:endParaRPr>
+                    </a:p>
+                  </a:txBody>
+                  <a:tcPr marL="46358" marR="46358" marT="0" marB="0" anchor="ctr"/>
+                </a:tc>
+                <a:tc>
+                  <a:txBody>
+                    <a:bodyPr/>
+                    <a:lstStyle/>
+                    <a:p>
+                      <a:pPr algn="ctr">
+                        <a:spcAft>
+                          <a:spcPts val="0"/>
+                        </a:spcAft>
+                      </a:pPr>
+                      <a:r>
+                        <a:rPr lang="en-US" sz="800" kern="0">
+                          <a:effectLst/>
+                        </a:rPr>
+                        <a:t>0.414</a:t>
+                      </a:r>
+                      <a:endParaRPr lang="en-CA" sz="700" kern="100">
+                        <a:effectLst/>
+                        <a:latin typeface="DengXian" panose="02010600030101010101" pitchFamily="2" charset="-122"/>
+                        <a:ea typeface="DengXian" panose="02010600030101010101" pitchFamily="2" charset="-122"/>
+                        <a:cs typeface="Times New Roman" panose="02020603050405020304" pitchFamily="18" charset="0"/>
+                      </a:endParaRPr>
+                    </a:p>
+                  </a:txBody>
+                  <a:tcPr marL="46358" marR="46358" marT="0" marB="0" anchor="ctr"/>
+                </a:tc>
+                <a:tc>
+                  <a:txBody>
+                    <a:bodyPr/>
+                    <a:lstStyle/>
+                    <a:p>
+                      <a:pPr algn="ctr">
+                        <a:spcAft>
+                          <a:spcPts val="0"/>
+                        </a:spcAft>
+                      </a:pPr>
+                      <a:r>
+                        <a:rPr lang="en-US" sz="800" kern="0">
+                          <a:effectLst/>
+                        </a:rPr>
+                        <a:t>0.352</a:t>
+                      </a:r>
+                      <a:endParaRPr lang="en-CA" sz="700" kern="100">
+                        <a:effectLst/>
+                        <a:latin typeface="DengXian" panose="02010600030101010101" pitchFamily="2" charset="-122"/>
+                        <a:ea typeface="DengXian" panose="02010600030101010101" pitchFamily="2" charset="-122"/>
+                        <a:cs typeface="Times New Roman" panose="02020603050405020304" pitchFamily="18" charset="0"/>
+                      </a:endParaRPr>
+                    </a:p>
+                  </a:txBody>
+                  <a:tcPr marL="46358" marR="46358" marT="0" marB="0" anchor="ctr"/>
+                </a:tc>
+                <a:tc>
+                  <a:txBody>
+                    <a:bodyPr/>
+                    <a:lstStyle/>
+                    <a:p>
+                      <a:pPr algn="ctr">
+                        <a:spcAft>
+                          <a:spcPts val="0"/>
+                        </a:spcAft>
+                      </a:pPr>
+                      <a:r>
+                        <a:rPr lang="en-US" sz="800" kern="0">
+                          <a:effectLst/>
+                        </a:rPr>
+                        <a:t>0.161</a:t>
+                      </a:r>
+                      <a:endParaRPr lang="en-CA" sz="700" kern="100">
+                        <a:effectLst/>
+                        <a:latin typeface="DengXian" panose="02010600030101010101" pitchFamily="2" charset="-122"/>
+                        <a:ea typeface="DengXian" panose="02010600030101010101" pitchFamily="2" charset="-122"/>
+                        <a:cs typeface="Times New Roman" panose="02020603050405020304" pitchFamily="18" charset="0"/>
+                      </a:endParaRPr>
+                    </a:p>
+                  </a:txBody>
+                  <a:tcPr marL="46358" marR="46358" marT="0" marB="0" anchor="ctr"/>
+                </a:tc>
+                <a:tc>
+                  <a:txBody>
+                    <a:bodyPr/>
+                    <a:lstStyle/>
+                    <a:p>
+                      <a:pPr algn="ctr">
+                        <a:spcAft>
+                          <a:spcPts val="0"/>
+                        </a:spcAft>
+                      </a:pPr>
+                      <a:r>
+                        <a:rPr lang="en-US" sz="800" kern="0">
+                          <a:effectLst/>
+                        </a:rPr>
+                        <a:t>0.265</a:t>
+                      </a:r>
+                      <a:endParaRPr lang="en-CA" sz="700" kern="100">
+                        <a:effectLst/>
+                        <a:latin typeface="DengXian" panose="02010600030101010101" pitchFamily="2" charset="-122"/>
+                        <a:ea typeface="DengXian" panose="02010600030101010101" pitchFamily="2" charset="-122"/>
+                        <a:cs typeface="Times New Roman" panose="02020603050405020304" pitchFamily="18" charset="0"/>
+                      </a:endParaRPr>
+                    </a:p>
+                  </a:txBody>
+                  <a:tcPr marL="46358" marR="46358" marT="0" marB="0" anchor="ctr"/>
+                </a:tc>
+                <a:tc>
+                  <a:txBody>
+                    <a:bodyPr/>
+                    <a:lstStyle/>
+                    <a:p>
+                      <a:pPr algn="ctr">
+                        <a:spcAft>
+                          <a:spcPts val="0"/>
+                        </a:spcAft>
+                      </a:pPr>
+                      <a:r>
+                        <a:rPr lang="en-US" sz="800" kern="0">
+                          <a:effectLst/>
+                        </a:rPr>
+                        <a:t>0.365</a:t>
+                      </a:r>
+                      <a:endParaRPr lang="en-CA" sz="700" kern="100">
+                        <a:effectLst/>
+                        <a:latin typeface="DengXian" panose="02010600030101010101" pitchFamily="2" charset="-122"/>
+                        <a:ea typeface="DengXian" panose="02010600030101010101" pitchFamily="2" charset="-122"/>
+                        <a:cs typeface="Times New Roman" panose="02020603050405020304" pitchFamily="18" charset="0"/>
+                      </a:endParaRPr>
+                    </a:p>
+                  </a:txBody>
+                  <a:tcPr marL="46358" marR="46358" marT="0" marB="0" anchor="ctr"/>
+                </a:tc>
+                <a:extLst>
+                  <a:ext uri="{0D108BD9-81ED-4DB2-BD59-A6C34878D82A}">
+                    <a16:rowId xmlns:a16="http://schemas.microsoft.com/office/drawing/2014/main" val="2596748248"/>
+                  </a:ext>
+                </a:extLst>
+              </a:tr>
+              <a:tr h="195276">
+                <a:tc>
+                  <a:txBody>
+                    <a:bodyPr/>
+                    <a:lstStyle/>
+                    <a:p>
+                      <a:pPr algn="ctr">
+                        <a:spcAft>
+                          <a:spcPts val="0"/>
+                        </a:spcAft>
+                      </a:pPr>
+                      <a:r>
+                        <a:rPr lang="en-US" sz="800" kern="0">
+                          <a:effectLst/>
+                        </a:rPr>
+                        <a:t>Yang_NEU</a:t>
+                      </a:r>
+                      <a:endParaRPr lang="en-CA" sz="700" kern="100">
+                        <a:effectLst/>
+                        <a:latin typeface="DengXian" panose="02010600030101010101" pitchFamily="2" charset="-122"/>
+                        <a:ea typeface="DengXian" panose="02010600030101010101" pitchFamily="2" charset="-122"/>
+                        <a:cs typeface="Times New Roman" panose="02020603050405020304" pitchFamily="18" charset="0"/>
+                      </a:endParaRPr>
+                    </a:p>
+                  </a:txBody>
+                  <a:tcPr marL="46358" marR="46358" marT="0" marB="0" anchor="ctr"/>
+                </a:tc>
+                <a:tc>
+                  <a:txBody>
+                    <a:bodyPr/>
+                    <a:lstStyle/>
+                    <a:p>
+                      <a:pPr algn="ctr">
+                        <a:spcAft>
+                          <a:spcPts val="0"/>
+                        </a:spcAft>
+                      </a:pPr>
+                      <a:r>
+                        <a:rPr lang="en-US" sz="800" kern="0">
+                          <a:effectLst/>
+                        </a:rPr>
+                        <a:t>0.568</a:t>
+                      </a:r>
+                      <a:endParaRPr lang="en-CA" sz="700" kern="100">
+                        <a:effectLst/>
+                        <a:latin typeface="DengXian" panose="02010600030101010101" pitchFamily="2" charset="-122"/>
+                        <a:ea typeface="DengXian" panose="02010600030101010101" pitchFamily="2" charset="-122"/>
+                        <a:cs typeface="Times New Roman" panose="02020603050405020304" pitchFamily="18" charset="0"/>
+                      </a:endParaRPr>
+                    </a:p>
+                  </a:txBody>
+                  <a:tcPr marL="46358" marR="46358" marT="0" marB="0" anchor="ctr"/>
+                </a:tc>
+                <a:tc>
+                  <a:txBody>
+                    <a:bodyPr/>
+                    <a:lstStyle/>
+                    <a:p>
+                      <a:pPr algn="ctr">
+                        <a:spcAft>
+                          <a:spcPts val="0"/>
+                        </a:spcAft>
+                      </a:pPr>
+                      <a:r>
+                        <a:rPr lang="en-US" sz="800" kern="0">
+                          <a:effectLst/>
+                        </a:rPr>
+                        <a:t>0.432</a:t>
+                      </a:r>
+                      <a:endParaRPr lang="en-CA" sz="700" kern="100">
+                        <a:effectLst/>
+                        <a:latin typeface="DengXian" panose="02010600030101010101" pitchFamily="2" charset="-122"/>
+                        <a:ea typeface="DengXian" panose="02010600030101010101" pitchFamily="2" charset="-122"/>
+                        <a:cs typeface="Times New Roman" panose="02020603050405020304" pitchFamily="18" charset="0"/>
+                      </a:endParaRPr>
+                    </a:p>
+                  </a:txBody>
+                  <a:tcPr marL="46358" marR="46358" marT="0" marB="0" anchor="ctr"/>
+                </a:tc>
+                <a:tc>
+                  <a:txBody>
+                    <a:bodyPr/>
+                    <a:lstStyle/>
+                    <a:p>
+                      <a:pPr algn="ctr">
+                        <a:spcAft>
+                          <a:spcPts val="0"/>
+                        </a:spcAft>
+                      </a:pPr>
+                      <a:r>
+                        <a:rPr lang="en-US" sz="800" kern="0">
+                          <a:effectLst/>
+                        </a:rPr>
+                        <a:t>0.351</a:t>
+                      </a:r>
+                      <a:endParaRPr lang="en-CA" sz="700" kern="100">
+                        <a:effectLst/>
+                        <a:latin typeface="DengXian" panose="02010600030101010101" pitchFamily="2" charset="-122"/>
+                        <a:ea typeface="DengXian" panose="02010600030101010101" pitchFamily="2" charset="-122"/>
+                        <a:cs typeface="Times New Roman" panose="02020603050405020304" pitchFamily="18" charset="0"/>
+                      </a:endParaRPr>
+                    </a:p>
+                  </a:txBody>
+                  <a:tcPr marL="46358" marR="46358" marT="0" marB="0" anchor="ctr"/>
+                </a:tc>
+                <a:tc>
+                  <a:txBody>
+                    <a:bodyPr/>
+                    <a:lstStyle/>
+                    <a:p>
+                      <a:pPr algn="ctr">
+                        <a:spcAft>
+                          <a:spcPts val="0"/>
+                        </a:spcAft>
+                      </a:pPr>
+                      <a:r>
+                        <a:rPr lang="en-US" sz="800" kern="0">
+                          <a:effectLst/>
+                        </a:rPr>
+                        <a:t>0.207</a:t>
+                      </a:r>
+                      <a:endParaRPr lang="en-CA" sz="700" kern="100">
+                        <a:effectLst/>
+                        <a:latin typeface="DengXian" panose="02010600030101010101" pitchFamily="2" charset="-122"/>
+                        <a:ea typeface="DengXian" panose="02010600030101010101" pitchFamily="2" charset="-122"/>
+                        <a:cs typeface="Times New Roman" panose="02020603050405020304" pitchFamily="18" charset="0"/>
+                      </a:endParaRPr>
+                    </a:p>
+                  </a:txBody>
+                  <a:tcPr marL="46358" marR="46358" marT="0" marB="0" anchor="ctr"/>
+                </a:tc>
+                <a:tc>
+                  <a:txBody>
+                    <a:bodyPr/>
+                    <a:lstStyle/>
+                    <a:p>
+                      <a:pPr algn="ctr">
+                        <a:spcAft>
+                          <a:spcPts val="0"/>
+                        </a:spcAft>
+                      </a:pPr>
+                      <a:r>
+                        <a:rPr lang="en-US" sz="800" kern="0">
+                          <a:effectLst/>
+                        </a:rPr>
+                        <a:t>0.255</a:t>
+                      </a:r>
+                      <a:endParaRPr lang="en-CA" sz="700" kern="100">
+                        <a:effectLst/>
+                        <a:latin typeface="DengXian" panose="02010600030101010101" pitchFamily="2" charset="-122"/>
+                        <a:ea typeface="DengXian" panose="02010600030101010101" pitchFamily="2" charset="-122"/>
+                        <a:cs typeface="Times New Roman" panose="02020603050405020304" pitchFamily="18" charset="0"/>
+                      </a:endParaRPr>
+                    </a:p>
+                  </a:txBody>
+                  <a:tcPr marL="46358" marR="46358" marT="0" marB="0" anchor="ctr"/>
+                </a:tc>
+                <a:tc>
+                  <a:txBody>
+                    <a:bodyPr/>
+                    <a:lstStyle/>
+                    <a:p>
+                      <a:pPr algn="ctr">
+                        <a:spcAft>
+                          <a:spcPts val="0"/>
+                        </a:spcAft>
+                      </a:pPr>
+                      <a:r>
+                        <a:rPr lang="en-US" sz="800" kern="0">
+                          <a:effectLst/>
+                        </a:rPr>
+                        <a:t>0.363</a:t>
+                      </a:r>
+                      <a:endParaRPr lang="en-CA" sz="700" kern="100">
+                        <a:effectLst/>
+                        <a:latin typeface="DengXian" panose="02010600030101010101" pitchFamily="2" charset="-122"/>
+                        <a:ea typeface="DengXian" panose="02010600030101010101" pitchFamily="2" charset="-122"/>
+                        <a:cs typeface="Times New Roman" panose="02020603050405020304" pitchFamily="18" charset="0"/>
+                      </a:endParaRPr>
+                    </a:p>
+                  </a:txBody>
+                  <a:tcPr marL="46358" marR="46358" marT="0" marB="0" anchor="ctr"/>
+                </a:tc>
+                <a:extLst>
+                  <a:ext uri="{0D108BD9-81ED-4DB2-BD59-A6C34878D82A}">
+                    <a16:rowId xmlns:a16="http://schemas.microsoft.com/office/drawing/2014/main" val="1229876198"/>
+                  </a:ext>
+                </a:extLst>
+              </a:tr>
+              <a:tr h="195276">
+                <a:tc>
+                  <a:txBody>
+                    <a:bodyPr/>
+                    <a:lstStyle/>
+                    <a:p>
+                      <a:pPr algn="ctr">
+                        <a:spcAft>
+                          <a:spcPts val="0"/>
+                        </a:spcAft>
+                      </a:pPr>
+                      <a:r>
+                        <a:rPr lang="en-US" sz="800" kern="0">
+                          <a:effectLst/>
+                        </a:rPr>
+                        <a:t>rax</a:t>
+                      </a:r>
+                      <a:endParaRPr lang="en-CA" sz="700" kern="100">
+                        <a:effectLst/>
+                        <a:latin typeface="DengXian" panose="02010600030101010101" pitchFamily="2" charset="-122"/>
+                        <a:ea typeface="DengXian" panose="02010600030101010101" pitchFamily="2" charset="-122"/>
+                        <a:cs typeface="Times New Roman" panose="02020603050405020304" pitchFamily="18" charset="0"/>
+                      </a:endParaRPr>
+                    </a:p>
+                  </a:txBody>
+                  <a:tcPr marL="46358" marR="46358" marT="0" marB="0" anchor="ctr"/>
+                </a:tc>
+                <a:tc>
+                  <a:txBody>
+                    <a:bodyPr/>
+                    <a:lstStyle/>
+                    <a:p>
+                      <a:pPr algn="ctr">
+                        <a:spcAft>
+                          <a:spcPts val="0"/>
+                        </a:spcAft>
+                      </a:pPr>
+                      <a:r>
+                        <a:rPr lang="en-US" sz="800" kern="0">
+                          <a:effectLst/>
+                        </a:rPr>
+                        <a:t>0.576</a:t>
+                      </a:r>
+                      <a:endParaRPr lang="en-CA" sz="700" kern="100">
+                        <a:effectLst/>
+                        <a:latin typeface="DengXian" panose="02010600030101010101" pitchFamily="2" charset="-122"/>
+                        <a:ea typeface="DengXian" panose="02010600030101010101" pitchFamily="2" charset="-122"/>
+                        <a:cs typeface="Times New Roman" panose="02020603050405020304" pitchFamily="18" charset="0"/>
+                      </a:endParaRPr>
+                    </a:p>
+                  </a:txBody>
+                  <a:tcPr marL="46358" marR="46358" marT="0" marB="0" anchor="ctr"/>
+                </a:tc>
+                <a:tc>
+                  <a:txBody>
+                    <a:bodyPr/>
+                    <a:lstStyle/>
+                    <a:p>
+                      <a:pPr algn="ctr">
+                        <a:spcAft>
+                          <a:spcPts val="0"/>
+                        </a:spcAft>
+                      </a:pPr>
+                      <a:r>
+                        <a:rPr lang="en-US" sz="800" kern="0">
+                          <a:effectLst/>
+                        </a:rPr>
+                        <a:t>0.421</a:t>
+                      </a:r>
+                      <a:endParaRPr lang="en-CA" sz="700" kern="100">
+                        <a:effectLst/>
+                        <a:latin typeface="DengXian" panose="02010600030101010101" pitchFamily="2" charset="-122"/>
+                        <a:ea typeface="DengXian" panose="02010600030101010101" pitchFamily="2" charset="-122"/>
+                        <a:cs typeface="Times New Roman" panose="02020603050405020304" pitchFamily="18" charset="0"/>
+                      </a:endParaRPr>
+                    </a:p>
+                  </a:txBody>
+                  <a:tcPr marL="46358" marR="46358" marT="0" marB="0" anchor="ctr"/>
+                </a:tc>
+                <a:tc>
+                  <a:txBody>
+                    <a:bodyPr/>
+                    <a:lstStyle/>
+                    <a:p>
+                      <a:pPr algn="ctr">
+                        <a:spcAft>
+                          <a:spcPts val="0"/>
+                        </a:spcAft>
+                      </a:pPr>
+                      <a:r>
+                        <a:rPr lang="en-US" sz="800" kern="0">
+                          <a:effectLst/>
+                        </a:rPr>
+                        <a:t>0.392</a:t>
+                      </a:r>
+                      <a:endParaRPr lang="en-CA" sz="700" kern="100">
+                        <a:effectLst/>
+                        <a:latin typeface="DengXian" panose="02010600030101010101" pitchFamily="2" charset="-122"/>
+                        <a:ea typeface="DengXian" panose="02010600030101010101" pitchFamily="2" charset="-122"/>
+                        <a:cs typeface="Times New Roman" panose="02020603050405020304" pitchFamily="18" charset="0"/>
+                      </a:endParaRPr>
+                    </a:p>
+                  </a:txBody>
+                  <a:tcPr marL="46358" marR="46358" marT="0" marB="0" anchor="ctr"/>
+                </a:tc>
+                <a:tc>
+                  <a:txBody>
+                    <a:bodyPr/>
+                    <a:lstStyle/>
+                    <a:p>
+                      <a:pPr algn="ctr">
+                        <a:spcAft>
+                          <a:spcPts val="0"/>
+                        </a:spcAft>
+                      </a:pPr>
+                      <a:r>
+                        <a:rPr lang="en-US" sz="800" kern="0">
+                          <a:effectLst/>
+                        </a:rPr>
+                        <a:t>0.103</a:t>
+                      </a:r>
+                      <a:endParaRPr lang="en-CA" sz="700" kern="100">
+                        <a:effectLst/>
+                        <a:latin typeface="DengXian" panose="02010600030101010101" pitchFamily="2" charset="-122"/>
+                        <a:ea typeface="DengXian" panose="02010600030101010101" pitchFamily="2" charset="-122"/>
+                        <a:cs typeface="Times New Roman" panose="02020603050405020304" pitchFamily="18" charset="0"/>
+                      </a:endParaRPr>
+                    </a:p>
+                  </a:txBody>
+                  <a:tcPr marL="46358" marR="46358" marT="0" marB="0" anchor="ctr"/>
+                </a:tc>
+                <a:tc>
+                  <a:txBody>
+                    <a:bodyPr/>
+                    <a:lstStyle/>
+                    <a:p>
+                      <a:pPr algn="ctr">
+                        <a:spcAft>
+                          <a:spcPts val="0"/>
+                        </a:spcAft>
+                      </a:pPr>
+                      <a:r>
+                        <a:rPr lang="en-US" sz="800" kern="0" dirty="0">
+                          <a:effectLst/>
+                        </a:rPr>
+                        <a:t>0.306</a:t>
+                      </a:r>
+                      <a:endParaRPr lang="en-CA" sz="700" kern="100" dirty="0">
+                        <a:effectLst/>
+                        <a:latin typeface="DengXian" panose="02010600030101010101" pitchFamily="2" charset="-122"/>
+                        <a:ea typeface="DengXian" panose="02010600030101010101" pitchFamily="2" charset="-122"/>
+                        <a:cs typeface="Times New Roman" panose="02020603050405020304" pitchFamily="18" charset="0"/>
+                      </a:endParaRPr>
+                    </a:p>
+                  </a:txBody>
+                  <a:tcPr marL="46358" marR="46358" marT="0" marB="0" anchor="ctr"/>
+                </a:tc>
+                <a:tc>
+                  <a:txBody>
+                    <a:bodyPr/>
+                    <a:lstStyle/>
+                    <a:p>
+                      <a:pPr algn="ctr">
+                        <a:spcAft>
+                          <a:spcPts val="0"/>
+                        </a:spcAft>
+                      </a:pPr>
+                      <a:r>
+                        <a:rPr lang="en-US" sz="800" kern="0">
+                          <a:effectLst/>
+                        </a:rPr>
+                        <a:t>0.360</a:t>
+                      </a:r>
+                      <a:endParaRPr lang="en-CA" sz="700" kern="100">
+                        <a:effectLst/>
+                        <a:latin typeface="DengXian" panose="02010600030101010101" pitchFamily="2" charset="-122"/>
+                        <a:ea typeface="DengXian" panose="02010600030101010101" pitchFamily="2" charset="-122"/>
+                        <a:cs typeface="Times New Roman" panose="02020603050405020304" pitchFamily="18" charset="0"/>
+                      </a:endParaRPr>
+                    </a:p>
+                  </a:txBody>
+                  <a:tcPr marL="46358" marR="46358" marT="0" marB="0" anchor="ctr"/>
+                </a:tc>
+                <a:extLst>
+                  <a:ext uri="{0D108BD9-81ED-4DB2-BD59-A6C34878D82A}">
+                    <a16:rowId xmlns:a16="http://schemas.microsoft.com/office/drawing/2014/main" val="2756645077"/>
+                  </a:ext>
+                </a:extLst>
+              </a:tr>
+              <a:tr h="195276">
+                <a:tc>
+                  <a:txBody>
+                    <a:bodyPr/>
+                    <a:lstStyle/>
+                    <a:p>
+                      <a:pPr algn="ctr">
+                        <a:spcAft>
+                          <a:spcPts val="0"/>
+                        </a:spcAft>
+                      </a:pPr>
+                      <a:r>
+                        <a:rPr lang="en-US" sz="800" kern="0">
+                          <a:effectLst/>
+                        </a:rPr>
+                        <a:t>NLP@WUST</a:t>
+                      </a:r>
+                      <a:endParaRPr lang="en-CA" sz="700" kern="100">
+                        <a:effectLst/>
+                        <a:latin typeface="DengXian" panose="02010600030101010101" pitchFamily="2" charset="-122"/>
+                        <a:ea typeface="DengXian" panose="02010600030101010101" pitchFamily="2" charset="-122"/>
+                        <a:cs typeface="Times New Roman" panose="02020603050405020304" pitchFamily="18" charset="0"/>
+                      </a:endParaRPr>
+                    </a:p>
+                  </a:txBody>
+                  <a:tcPr marL="46358" marR="46358" marT="0" marB="0" anchor="ctr"/>
+                </a:tc>
+                <a:tc>
+                  <a:txBody>
+                    <a:bodyPr/>
+                    <a:lstStyle/>
+                    <a:p>
+                      <a:pPr algn="ctr">
+                        <a:spcAft>
+                          <a:spcPts val="0"/>
+                        </a:spcAft>
+                      </a:pPr>
+                      <a:r>
+                        <a:rPr lang="en-US" sz="800" kern="0">
+                          <a:effectLst/>
+                        </a:rPr>
+                        <a:t>0.630</a:t>
+                      </a:r>
+                      <a:endParaRPr lang="en-CA" sz="700" kern="100">
+                        <a:effectLst/>
+                        <a:latin typeface="DengXian" panose="02010600030101010101" pitchFamily="2" charset="-122"/>
+                        <a:ea typeface="DengXian" panose="02010600030101010101" pitchFamily="2" charset="-122"/>
+                        <a:cs typeface="Times New Roman" panose="02020603050405020304" pitchFamily="18" charset="0"/>
+                      </a:endParaRPr>
+                    </a:p>
+                  </a:txBody>
+                  <a:tcPr marL="46358" marR="46358" marT="0" marB="0" anchor="ctr"/>
+                </a:tc>
+                <a:tc>
+                  <a:txBody>
+                    <a:bodyPr/>
+                    <a:lstStyle/>
+                    <a:p>
+                      <a:pPr algn="ctr">
+                        <a:spcAft>
+                          <a:spcPts val="0"/>
+                        </a:spcAft>
+                      </a:pPr>
+                      <a:r>
+                        <a:rPr lang="en-US" sz="800" kern="0">
+                          <a:effectLst/>
+                        </a:rPr>
+                        <a:t>0.374</a:t>
+                      </a:r>
+                      <a:endParaRPr lang="en-CA" sz="700" kern="100">
+                        <a:effectLst/>
+                        <a:latin typeface="DengXian" panose="02010600030101010101" pitchFamily="2" charset="-122"/>
+                        <a:ea typeface="DengXian" panose="02010600030101010101" pitchFamily="2" charset="-122"/>
+                        <a:cs typeface="Times New Roman" panose="02020603050405020304" pitchFamily="18" charset="0"/>
+                      </a:endParaRPr>
+                    </a:p>
+                  </a:txBody>
+                  <a:tcPr marL="46358" marR="46358" marT="0" marB="0" anchor="ctr"/>
+                </a:tc>
+                <a:tc>
+                  <a:txBody>
+                    <a:bodyPr/>
+                    <a:lstStyle/>
+                    <a:p>
+                      <a:pPr algn="ctr">
+                        <a:spcAft>
+                          <a:spcPts val="0"/>
+                        </a:spcAft>
+                      </a:pPr>
+                      <a:r>
+                        <a:rPr lang="en-US" sz="800" kern="0">
+                          <a:effectLst/>
+                        </a:rPr>
+                        <a:t>0.287</a:t>
+                      </a:r>
+                      <a:endParaRPr lang="en-CA" sz="700" kern="100">
+                        <a:effectLst/>
+                        <a:latin typeface="DengXian" panose="02010600030101010101" pitchFamily="2" charset="-122"/>
+                        <a:ea typeface="DengXian" panose="02010600030101010101" pitchFamily="2" charset="-122"/>
+                        <a:cs typeface="Times New Roman" panose="02020603050405020304" pitchFamily="18" charset="0"/>
+                      </a:endParaRPr>
+                    </a:p>
+                  </a:txBody>
+                  <a:tcPr marL="46358" marR="46358" marT="0" marB="0" anchor="ctr"/>
+                </a:tc>
+                <a:tc>
+                  <a:txBody>
+                    <a:bodyPr/>
+                    <a:lstStyle/>
+                    <a:p>
+                      <a:pPr algn="ctr">
+                        <a:spcAft>
+                          <a:spcPts val="0"/>
+                        </a:spcAft>
+                      </a:pPr>
+                      <a:r>
+                        <a:rPr lang="en-US" sz="800" kern="0">
+                          <a:effectLst/>
+                        </a:rPr>
+                        <a:t>0.146</a:t>
+                      </a:r>
+                      <a:endParaRPr lang="en-CA" sz="700" kern="100">
+                        <a:effectLst/>
+                        <a:latin typeface="DengXian" panose="02010600030101010101" pitchFamily="2" charset="-122"/>
+                        <a:ea typeface="DengXian" panose="02010600030101010101" pitchFamily="2" charset="-122"/>
+                        <a:cs typeface="Times New Roman" panose="02020603050405020304" pitchFamily="18" charset="0"/>
+                      </a:endParaRPr>
+                    </a:p>
+                  </a:txBody>
+                  <a:tcPr marL="46358" marR="46358" marT="0" marB="0" anchor="ctr"/>
+                </a:tc>
+                <a:tc>
+                  <a:txBody>
+                    <a:bodyPr/>
+                    <a:lstStyle/>
+                    <a:p>
+                      <a:pPr algn="ctr">
+                        <a:spcAft>
+                          <a:spcPts val="0"/>
+                        </a:spcAft>
+                      </a:pPr>
+                      <a:r>
+                        <a:rPr lang="en-US" sz="800" kern="0">
+                          <a:effectLst/>
+                        </a:rPr>
+                        <a:t>0.354</a:t>
+                      </a:r>
+                      <a:endParaRPr lang="en-CA" sz="700" kern="100">
+                        <a:effectLst/>
+                        <a:latin typeface="DengXian" panose="02010600030101010101" pitchFamily="2" charset="-122"/>
+                        <a:ea typeface="DengXian" panose="02010600030101010101" pitchFamily="2" charset="-122"/>
+                        <a:cs typeface="Times New Roman" panose="02020603050405020304" pitchFamily="18" charset="0"/>
+                      </a:endParaRPr>
+                    </a:p>
+                  </a:txBody>
+                  <a:tcPr marL="46358" marR="46358" marT="0" marB="0" anchor="ctr"/>
+                </a:tc>
+                <a:tc>
+                  <a:txBody>
+                    <a:bodyPr/>
+                    <a:lstStyle/>
+                    <a:p>
+                      <a:pPr algn="ctr">
+                        <a:spcAft>
+                          <a:spcPts val="0"/>
+                        </a:spcAft>
+                      </a:pPr>
+                      <a:r>
+                        <a:rPr lang="en-US" sz="800" kern="0">
+                          <a:effectLst/>
+                        </a:rPr>
+                        <a:t>0.358</a:t>
+                      </a:r>
+                      <a:endParaRPr lang="en-CA" sz="700" kern="100">
+                        <a:effectLst/>
+                        <a:latin typeface="DengXian" panose="02010600030101010101" pitchFamily="2" charset="-122"/>
+                        <a:ea typeface="DengXian" panose="02010600030101010101" pitchFamily="2" charset="-122"/>
+                        <a:cs typeface="Times New Roman" panose="02020603050405020304" pitchFamily="18" charset="0"/>
+                      </a:endParaRPr>
+                    </a:p>
+                  </a:txBody>
+                  <a:tcPr marL="46358" marR="46358" marT="0" marB="0" anchor="ctr"/>
+                </a:tc>
+                <a:extLst>
+                  <a:ext uri="{0D108BD9-81ED-4DB2-BD59-A6C34878D82A}">
+                    <a16:rowId xmlns:a16="http://schemas.microsoft.com/office/drawing/2014/main" val="3538166350"/>
+                  </a:ext>
+                </a:extLst>
+              </a:tr>
+              <a:tr h="195276">
+                <a:tc>
+                  <a:txBody>
+                    <a:bodyPr/>
+                    <a:lstStyle/>
+                    <a:p>
+                      <a:pPr algn="ctr">
+                        <a:spcAft>
+                          <a:spcPts val="0"/>
+                        </a:spcAft>
+                      </a:pPr>
+                      <a:r>
+                        <a:rPr lang="en-US" sz="800" kern="0">
+                          <a:effectLst/>
+                        </a:rPr>
+                        <a:t>scau_geek</a:t>
+                      </a:r>
+                      <a:endParaRPr lang="en-CA" sz="700" kern="100">
+                        <a:effectLst/>
+                        <a:latin typeface="DengXian" panose="02010600030101010101" pitchFamily="2" charset="-122"/>
+                        <a:ea typeface="DengXian" panose="02010600030101010101" pitchFamily="2" charset="-122"/>
+                        <a:cs typeface="Times New Roman" panose="02020603050405020304" pitchFamily="18" charset="0"/>
+                      </a:endParaRPr>
+                    </a:p>
+                  </a:txBody>
+                  <a:tcPr marL="46358" marR="46358" marT="0" marB="0" anchor="ctr"/>
+                </a:tc>
+                <a:tc>
+                  <a:txBody>
+                    <a:bodyPr/>
+                    <a:lstStyle/>
+                    <a:p>
+                      <a:pPr algn="ctr">
+                        <a:spcAft>
+                          <a:spcPts val="0"/>
+                        </a:spcAft>
+                      </a:pPr>
+                      <a:r>
+                        <a:rPr lang="en-US" sz="800" kern="0">
+                          <a:effectLst/>
+                        </a:rPr>
+                        <a:t>0.615</a:t>
+                      </a:r>
+                      <a:endParaRPr lang="en-CA" sz="700" kern="100">
+                        <a:effectLst/>
+                        <a:latin typeface="DengXian" panose="02010600030101010101" pitchFamily="2" charset="-122"/>
+                        <a:ea typeface="DengXian" panose="02010600030101010101" pitchFamily="2" charset="-122"/>
+                        <a:cs typeface="Times New Roman" panose="02020603050405020304" pitchFamily="18" charset="0"/>
+                      </a:endParaRPr>
+                    </a:p>
+                  </a:txBody>
+                  <a:tcPr marL="46358" marR="46358" marT="0" marB="0" anchor="ctr"/>
+                </a:tc>
+                <a:tc>
+                  <a:txBody>
+                    <a:bodyPr/>
+                    <a:lstStyle/>
+                    <a:p>
+                      <a:pPr algn="ctr">
+                        <a:spcAft>
+                          <a:spcPts val="0"/>
+                        </a:spcAft>
+                      </a:pPr>
+                      <a:r>
+                        <a:rPr lang="en-US" sz="800" kern="0">
+                          <a:effectLst/>
+                        </a:rPr>
+                        <a:t>0.480</a:t>
+                      </a:r>
+                      <a:endParaRPr lang="en-CA" sz="700" kern="100">
+                        <a:effectLst/>
+                        <a:latin typeface="DengXian" panose="02010600030101010101" pitchFamily="2" charset="-122"/>
+                        <a:ea typeface="DengXian" panose="02010600030101010101" pitchFamily="2" charset="-122"/>
+                        <a:cs typeface="Times New Roman" panose="02020603050405020304" pitchFamily="18" charset="0"/>
+                      </a:endParaRPr>
+                    </a:p>
+                  </a:txBody>
+                  <a:tcPr marL="46358" marR="46358" marT="0" marB="0" anchor="ctr"/>
+                </a:tc>
+                <a:tc>
+                  <a:txBody>
+                    <a:bodyPr/>
+                    <a:lstStyle/>
+                    <a:p>
+                      <a:pPr algn="ctr">
+                        <a:spcAft>
+                          <a:spcPts val="0"/>
+                        </a:spcAft>
+                      </a:pPr>
+                      <a:r>
+                        <a:rPr lang="en-US" sz="800" kern="0">
+                          <a:effectLst/>
+                        </a:rPr>
+                        <a:t>0.398</a:t>
+                      </a:r>
+                      <a:endParaRPr lang="en-CA" sz="700" kern="100">
+                        <a:effectLst/>
+                        <a:latin typeface="DengXian" panose="02010600030101010101" pitchFamily="2" charset="-122"/>
+                        <a:ea typeface="DengXian" panose="02010600030101010101" pitchFamily="2" charset="-122"/>
+                        <a:cs typeface="Times New Roman" panose="02020603050405020304" pitchFamily="18" charset="0"/>
+                      </a:endParaRPr>
+                    </a:p>
+                  </a:txBody>
+                  <a:tcPr marL="46358" marR="46358" marT="0" marB="0" anchor="ctr"/>
+                </a:tc>
+                <a:tc>
+                  <a:txBody>
+                    <a:bodyPr/>
+                    <a:lstStyle/>
+                    <a:p>
+                      <a:pPr algn="ctr">
+                        <a:spcAft>
+                          <a:spcPts val="0"/>
+                        </a:spcAft>
+                      </a:pPr>
+                      <a:r>
+                        <a:rPr lang="en-US" sz="800" kern="0">
+                          <a:effectLst/>
+                        </a:rPr>
+                        <a:t>0.000</a:t>
+                      </a:r>
+                      <a:endParaRPr lang="en-CA" sz="700" kern="100">
+                        <a:effectLst/>
+                        <a:latin typeface="DengXian" panose="02010600030101010101" pitchFamily="2" charset="-122"/>
+                        <a:ea typeface="DengXian" panose="02010600030101010101" pitchFamily="2" charset="-122"/>
+                        <a:cs typeface="Times New Roman" panose="02020603050405020304" pitchFamily="18" charset="0"/>
+                      </a:endParaRPr>
+                    </a:p>
+                  </a:txBody>
+                  <a:tcPr marL="46358" marR="46358" marT="0" marB="0" anchor="ctr"/>
+                </a:tc>
+                <a:tc>
+                  <a:txBody>
+                    <a:bodyPr/>
+                    <a:lstStyle/>
+                    <a:p>
+                      <a:pPr algn="ctr">
+                        <a:spcAft>
+                          <a:spcPts val="0"/>
+                        </a:spcAft>
+                      </a:pPr>
+                      <a:r>
+                        <a:rPr lang="en-US" sz="800" kern="0" dirty="0">
+                          <a:effectLst/>
+                        </a:rPr>
+                        <a:t>0.230</a:t>
+                      </a:r>
+                      <a:endParaRPr lang="en-CA" sz="700" kern="100" dirty="0">
+                        <a:effectLst/>
+                        <a:latin typeface="DengXian" panose="02010600030101010101" pitchFamily="2" charset="-122"/>
+                        <a:ea typeface="DengXian" panose="02010600030101010101" pitchFamily="2" charset="-122"/>
+                        <a:cs typeface="Times New Roman" panose="02020603050405020304" pitchFamily="18" charset="0"/>
+                      </a:endParaRPr>
+                    </a:p>
+                  </a:txBody>
+                  <a:tcPr marL="46358" marR="46358" marT="0" marB="0" anchor="ctr"/>
+                </a:tc>
+                <a:tc>
+                  <a:txBody>
+                    <a:bodyPr/>
+                    <a:lstStyle/>
+                    <a:p>
+                      <a:pPr algn="ctr">
+                        <a:spcAft>
+                          <a:spcPts val="0"/>
+                        </a:spcAft>
+                      </a:pPr>
+                      <a:r>
+                        <a:rPr lang="en-US" sz="800" kern="0">
+                          <a:effectLst/>
+                        </a:rPr>
+                        <a:t>0.345</a:t>
+                      </a:r>
+                      <a:endParaRPr lang="en-CA" sz="700" kern="100">
+                        <a:effectLst/>
+                        <a:latin typeface="DengXian" panose="02010600030101010101" pitchFamily="2" charset="-122"/>
+                        <a:ea typeface="DengXian" panose="02010600030101010101" pitchFamily="2" charset="-122"/>
+                        <a:cs typeface="Times New Roman" panose="02020603050405020304" pitchFamily="18" charset="0"/>
+                      </a:endParaRPr>
+                    </a:p>
+                  </a:txBody>
+                  <a:tcPr marL="46358" marR="46358" marT="0" marB="0" anchor="ctr"/>
+                </a:tc>
+                <a:extLst>
+                  <a:ext uri="{0D108BD9-81ED-4DB2-BD59-A6C34878D82A}">
+                    <a16:rowId xmlns:a16="http://schemas.microsoft.com/office/drawing/2014/main" val="3459307652"/>
+                  </a:ext>
+                </a:extLst>
+              </a:tr>
+              <a:tr h="195276">
+                <a:tc>
+                  <a:txBody>
+                    <a:bodyPr/>
+                    <a:lstStyle/>
+                    <a:p>
+                      <a:pPr algn="ctr">
+                        <a:spcAft>
+                          <a:spcPts val="0"/>
+                        </a:spcAft>
+                      </a:pPr>
+                      <a:r>
+                        <a:rPr lang="en-US" sz="800" kern="0">
+                          <a:effectLst/>
+                        </a:rPr>
+                        <a:t>Baseline</a:t>
+                      </a:r>
+                      <a:endParaRPr lang="en-CA" sz="700" kern="100">
+                        <a:effectLst/>
+                        <a:latin typeface="DengXian" panose="02010600030101010101" pitchFamily="2" charset="-122"/>
+                        <a:ea typeface="DengXian" panose="02010600030101010101" pitchFamily="2" charset="-122"/>
+                        <a:cs typeface="Times New Roman" panose="02020603050405020304" pitchFamily="18" charset="0"/>
+                      </a:endParaRPr>
+                    </a:p>
+                  </a:txBody>
+                  <a:tcPr marL="46358" marR="46358" marT="0" marB="0" anchor="ctr"/>
+                </a:tc>
+                <a:tc>
+                  <a:txBody>
+                    <a:bodyPr/>
+                    <a:lstStyle/>
+                    <a:p>
+                      <a:pPr algn="ctr">
+                        <a:spcAft>
+                          <a:spcPts val="0"/>
+                        </a:spcAft>
+                      </a:pPr>
+                      <a:r>
+                        <a:rPr lang="en-US" sz="800" b="1" kern="0" dirty="0">
+                          <a:effectLst/>
+                        </a:rPr>
+                        <a:t>0.587</a:t>
+                      </a:r>
+                      <a:endParaRPr lang="en-CA" sz="700" b="1" kern="100" dirty="0">
+                        <a:effectLst/>
+                        <a:latin typeface="DengXian" panose="02010600030101010101" pitchFamily="2" charset="-122"/>
+                        <a:ea typeface="DengXian" panose="02010600030101010101" pitchFamily="2" charset="-122"/>
+                        <a:cs typeface="Times New Roman" panose="02020603050405020304" pitchFamily="18" charset="0"/>
+                      </a:endParaRPr>
+                    </a:p>
+                  </a:txBody>
+                  <a:tcPr marL="46358" marR="46358" marT="0" marB="0" anchor="ctr"/>
+                </a:tc>
+                <a:tc>
+                  <a:txBody>
+                    <a:bodyPr/>
+                    <a:lstStyle/>
+                    <a:p>
+                      <a:pPr algn="ctr">
+                        <a:spcAft>
+                          <a:spcPts val="0"/>
+                        </a:spcAft>
+                      </a:pPr>
+                      <a:r>
+                        <a:rPr lang="en-US" sz="800" b="1" kern="0" dirty="0">
+                          <a:effectLst/>
+                        </a:rPr>
+                        <a:t>0.500</a:t>
+                      </a:r>
+                      <a:endParaRPr lang="en-CA" sz="700" b="1" kern="100" dirty="0">
+                        <a:effectLst/>
+                        <a:latin typeface="DengXian" panose="02010600030101010101" pitchFamily="2" charset="-122"/>
+                        <a:ea typeface="DengXian" panose="02010600030101010101" pitchFamily="2" charset="-122"/>
+                        <a:cs typeface="Times New Roman" panose="02020603050405020304" pitchFamily="18" charset="0"/>
+                      </a:endParaRPr>
+                    </a:p>
+                  </a:txBody>
+                  <a:tcPr marL="46358" marR="46358" marT="0" marB="0" anchor="ctr"/>
+                </a:tc>
+                <a:tc>
+                  <a:txBody>
+                    <a:bodyPr/>
+                    <a:lstStyle/>
+                    <a:p>
+                      <a:pPr algn="ctr">
+                        <a:spcAft>
+                          <a:spcPts val="0"/>
+                        </a:spcAft>
+                      </a:pPr>
+                      <a:r>
+                        <a:rPr lang="en-US" sz="800" b="1" kern="0" dirty="0">
+                          <a:effectLst/>
+                        </a:rPr>
+                        <a:t>0.390</a:t>
+                      </a:r>
+                      <a:endParaRPr lang="en-CA" sz="700" b="1" kern="100" dirty="0">
+                        <a:effectLst/>
+                        <a:latin typeface="DengXian" panose="02010600030101010101" pitchFamily="2" charset="-122"/>
+                        <a:ea typeface="DengXian" panose="02010600030101010101" pitchFamily="2" charset="-122"/>
+                        <a:cs typeface="Times New Roman" panose="02020603050405020304" pitchFamily="18" charset="0"/>
+                      </a:endParaRPr>
+                    </a:p>
+                  </a:txBody>
+                  <a:tcPr marL="46358" marR="46358" marT="0" marB="0" anchor="ctr"/>
+                </a:tc>
+                <a:tc>
+                  <a:txBody>
+                    <a:bodyPr/>
+                    <a:lstStyle/>
+                    <a:p>
+                      <a:pPr algn="ctr">
+                        <a:spcAft>
+                          <a:spcPts val="0"/>
+                        </a:spcAft>
+                      </a:pPr>
+                      <a:r>
+                        <a:rPr lang="en-US" sz="800" b="1" kern="0" dirty="0">
+                          <a:effectLst/>
+                        </a:rPr>
+                        <a:t>0.108</a:t>
+                      </a:r>
+                      <a:endParaRPr lang="en-CA" sz="700" b="1" kern="100" dirty="0">
+                        <a:effectLst/>
+                        <a:latin typeface="DengXian" panose="02010600030101010101" pitchFamily="2" charset="-122"/>
+                        <a:ea typeface="DengXian" panose="02010600030101010101" pitchFamily="2" charset="-122"/>
+                        <a:cs typeface="Times New Roman" panose="02020603050405020304" pitchFamily="18" charset="0"/>
+                      </a:endParaRPr>
+                    </a:p>
+                  </a:txBody>
+                  <a:tcPr marL="46358" marR="46358" marT="0" marB="0" anchor="ctr"/>
+                </a:tc>
+                <a:tc>
+                  <a:txBody>
+                    <a:bodyPr/>
+                    <a:lstStyle/>
+                    <a:p>
+                      <a:pPr algn="ctr">
+                        <a:spcAft>
+                          <a:spcPts val="0"/>
+                        </a:spcAft>
+                      </a:pPr>
+                      <a:r>
+                        <a:rPr lang="en-US" sz="800" b="1" kern="0" dirty="0">
+                          <a:effectLst/>
+                        </a:rPr>
+                        <a:t>0.128</a:t>
+                      </a:r>
+                      <a:endParaRPr lang="en-CA" sz="700" b="1" kern="100" dirty="0">
+                        <a:effectLst/>
+                        <a:latin typeface="DengXian" panose="02010600030101010101" pitchFamily="2" charset="-122"/>
+                        <a:ea typeface="DengXian" panose="02010600030101010101" pitchFamily="2" charset="-122"/>
+                        <a:cs typeface="Times New Roman" panose="02020603050405020304" pitchFamily="18" charset="0"/>
+                      </a:endParaRPr>
+                    </a:p>
+                  </a:txBody>
+                  <a:tcPr marL="46358" marR="46358" marT="0" marB="0" anchor="ctr"/>
+                </a:tc>
+                <a:tc>
+                  <a:txBody>
+                    <a:bodyPr/>
+                    <a:lstStyle/>
+                    <a:p>
+                      <a:pPr algn="ctr">
+                        <a:spcAft>
+                          <a:spcPts val="0"/>
+                        </a:spcAft>
+                      </a:pPr>
+                      <a:r>
+                        <a:rPr lang="en-US" sz="800" b="1" kern="0" dirty="0">
+                          <a:effectLst/>
+                        </a:rPr>
+                        <a:t>0.342</a:t>
+                      </a:r>
+                      <a:endParaRPr lang="en-CA" sz="700" b="1" kern="100" dirty="0">
+                        <a:effectLst/>
+                        <a:latin typeface="DengXian" panose="02010600030101010101" pitchFamily="2" charset="-122"/>
+                        <a:ea typeface="DengXian" panose="02010600030101010101" pitchFamily="2" charset="-122"/>
+                        <a:cs typeface="Times New Roman" panose="02020603050405020304" pitchFamily="18" charset="0"/>
+                      </a:endParaRPr>
+                    </a:p>
+                  </a:txBody>
+                  <a:tcPr marL="46358" marR="46358" marT="0" marB="0" anchor="ctr"/>
+                </a:tc>
+                <a:extLst>
+                  <a:ext uri="{0D108BD9-81ED-4DB2-BD59-A6C34878D82A}">
+                    <a16:rowId xmlns:a16="http://schemas.microsoft.com/office/drawing/2014/main" val="1274509362"/>
+                  </a:ext>
+                </a:extLst>
+              </a:tr>
+              <a:tr h="195276">
+                <a:tc>
+                  <a:txBody>
+                    <a:bodyPr/>
+                    <a:lstStyle/>
+                    <a:p>
+                      <a:pPr algn="ctr">
+                        <a:spcAft>
+                          <a:spcPts val="0"/>
+                        </a:spcAft>
+                      </a:pPr>
+                      <a:r>
+                        <a:rPr lang="en-US" sz="800" kern="0">
+                          <a:effectLst/>
+                        </a:rPr>
+                        <a:t>Lab1010</a:t>
+                      </a:r>
+                      <a:endParaRPr lang="en-CA" sz="700" kern="100">
+                        <a:effectLst/>
+                        <a:latin typeface="DengXian" panose="02010600030101010101" pitchFamily="2" charset="-122"/>
+                        <a:ea typeface="DengXian" panose="02010600030101010101" pitchFamily="2" charset="-122"/>
+                        <a:cs typeface="Times New Roman" panose="02020603050405020304" pitchFamily="18" charset="0"/>
+                      </a:endParaRPr>
+                    </a:p>
+                  </a:txBody>
+                  <a:tcPr marL="46358" marR="46358" marT="0" marB="0" anchor="ctr"/>
+                </a:tc>
+                <a:tc>
+                  <a:txBody>
+                    <a:bodyPr/>
+                    <a:lstStyle/>
+                    <a:p>
+                      <a:pPr algn="ctr">
+                        <a:spcAft>
+                          <a:spcPts val="0"/>
+                        </a:spcAft>
+                      </a:pPr>
+                      <a:r>
+                        <a:rPr lang="en-US" sz="800" kern="0">
+                          <a:effectLst/>
+                        </a:rPr>
+                        <a:t>0.385</a:t>
+                      </a:r>
+                      <a:endParaRPr lang="en-CA" sz="700" kern="100">
+                        <a:effectLst/>
+                        <a:latin typeface="DengXian" panose="02010600030101010101" pitchFamily="2" charset="-122"/>
+                        <a:ea typeface="DengXian" panose="02010600030101010101" pitchFamily="2" charset="-122"/>
+                        <a:cs typeface="Times New Roman" panose="02020603050405020304" pitchFamily="18" charset="0"/>
+                      </a:endParaRPr>
+                    </a:p>
+                  </a:txBody>
+                  <a:tcPr marL="46358" marR="46358" marT="0" marB="0" anchor="ctr"/>
+                </a:tc>
+                <a:tc>
+                  <a:txBody>
+                    <a:bodyPr/>
+                    <a:lstStyle/>
+                    <a:p>
+                      <a:pPr algn="ctr">
+                        <a:spcAft>
+                          <a:spcPts val="0"/>
+                        </a:spcAft>
+                      </a:pPr>
+                      <a:r>
+                        <a:rPr lang="en-US" sz="800" kern="0">
+                          <a:effectLst/>
+                        </a:rPr>
+                        <a:t>0.458</a:t>
+                      </a:r>
+                      <a:endParaRPr lang="en-CA" sz="700" kern="100">
+                        <a:effectLst/>
+                        <a:latin typeface="DengXian" panose="02010600030101010101" pitchFamily="2" charset="-122"/>
+                        <a:ea typeface="DengXian" panose="02010600030101010101" pitchFamily="2" charset="-122"/>
+                        <a:cs typeface="Times New Roman" panose="02020603050405020304" pitchFamily="18" charset="0"/>
+                      </a:endParaRPr>
+                    </a:p>
+                  </a:txBody>
+                  <a:tcPr marL="46358" marR="46358" marT="0" marB="0" anchor="ctr"/>
+                </a:tc>
+                <a:tc>
+                  <a:txBody>
+                    <a:bodyPr/>
+                    <a:lstStyle/>
+                    <a:p>
+                      <a:pPr algn="ctr">
+                        <a:spcAft>
+                          <a:spcPts val="0"/>
+                        </a:spcAft>
+                      </a:pPr>
+                      <a:r>
+                        <a:rPr lang="en-US" sz="800" kern="0">
+                          <a:effectLst/>
+                        </a:rPr>
+                        <a:t>0.271</a:t>
+                      </a:r>
+                      <a:endParaRPr lang="en-CA" sz="700" kern="100">
+                        <a:effectLst/>
+                        <a:latin typeface="DengXian" panose="02010600030101010101" pitchFamily="2" charset="-122"/>
+                        <a:ea typeface="DengXian" panose="02010600030101010101" pitchFamily="2" charset="-122"/>
+                        <a:cs typeface="Times New Roman" panose="02020603050405020304" pitchFamily="18" charset="0"/>
+                      </a:endParaRPr>
+                    </a:p>
+                  </a:txBody>
+                  <a:tcPr marL="46358" marR="46358" marT="0" marB="0" anchor="ctr"/>
+                </a:tc>
+                <a:tc>
+                  <a:txBody>
+                    <a:bodyPr/>
+                    <a:lstStyle/>
+                    <a:p>
+                      <a:pPr algn="ctr">
+                        <a:spcAft>
+                          <a:spcPts val="0"/>
+                        </a:spcAft>
+                      </a:pPr>
+                      <a:r>
+                        <a:rPr lang="en-US" sz="800" kern="0">
+                          <a:effectLst/>
+                        </a:rPr>
+                        <a:t>0.061</a:t>
+                      </a:r>
+                      <a:endParaRPr lang="en-CA" sz="700" kern="100">
+                        <a:effectLst/>
+                        <a:latin typeface="DengXian" panose="02010600030101010101" pitchFamily="2" charset="-122"/>
+                        <a:ea typeface="DengXian" panose="02010600030101010101" pitchFamily="2" charset="-122"/>
+                        <a:cs typeface="Times New Roman" panose="02020603050405020304" pitchFamily="18" charset="0"/>
+                      </a:endParaRPr>
+                    </a:p>
+                  </a:txBody>
+                  <a:tcPr marL="46358" marR="46358" marT="0" marB="0" anchor="ctr"/>
+                </a:tc>
+                <a:tc>
+                  <a:txBody>
+                    <a:bodyPr/>
+                    <a:lstStyle/>
+                    <a:p>
+                      <a:pPr algn="ctr">
+                        <a:spcAft>
+                          <a:spcPts val="0"/>
+                        </a:spcAft>
+                      </a:pPr>
+                      <a:r>
+                        <a:rPr lang="en-US" sz="800" kern="0" dirty="0">
+                          <a:effectLst/>
+                        </a:rPr>
+                        <a:t>0.063</a:t>
+                      </a:r>
+                      <a:endParaRPr lang="en-CA" sz="700" kern="100" dirty="0">
+                        <a:effectLst/>
+                        <a:latin typeface="DengXian" panose="02010600030101010101" pitchFamily="2" charset="-122"/>
+                        <a:ea typeface="DengXian" panose="02010600030101010101" pitchFamily="2" charset="-122"/>
+                        <a:cs typeface="Times New Roman" panose="02020603050405020304" pitchFamily="18" charset="0"/>
+                      </a:endParaRPr>
+                    </a:p>
+                  </a:txBody>
+                  <a:tcPr marL="46358" marR="46358" marT="0" marB="0" anchor="ctr"/>
+                </a:tc>
+                <a:tc>
+                  <a:txBody>
+                    <a:bodyPr/>
+                    <a:lstStyle/>
+                    <a:p>
+                      <a:pPr algn="ctr">
+                        <a:spcAft>
+                          <a:spcPts val="0"/>
+                        </a:spcAft>
+                      </a:pPr>
+                      <a:r>
+                        <a:rPr lang="en-US" sz="800" kern="0">
+                          <a:effectLst/>
+                        </a:rPr>
+                        <a:t>0.248</a:t>
+                      </a:r>
+                      <a:endParaRPr lang="en-CA" sz="700" kern="100">
+                        <a:effectLst/>
+                        <a:latin typeface="DengXian" panose="02010600030101010101" pitchFamily="2" charset="-122"/>
+                        <a:ea typeface="DengXian" panose="02010600030101010101" pitchFamily="2" charset="-122"/>
+                        <a:cs typeface="Times New Roman" panose="02020603050405020304" pitchFamily="18" charset="0"/>
+                      </a:endParaRPr>
+                    </a:p>
+                  </a:txBody>
+                  <a:tcPr marL="46358" marR="46358" marT="0" marB="0" anchor="ctr"/>
+                </a:tc>
+                <a:extLst>
+                  <a:ext uri="{0D108BD9-81ED-4DB2-BD59-A6C34878D82A}">
+                    <a16:rowId xmlns:a16="http://schemas.microsoft.com/office/drawing/2014/main" val="46513715"/>
+                  </a:ext>
+                </a:extLst>
+              </a:tr>
+              <a:tr h="299944">
+                <a:tc>
+                  <a:txBody>
+                    <a:bodyPr/>
+                    <a:lstStyle/>
+                    <a:p>
+                      <a:pPr algn="ctr">
+                        <a:spcAft>
+                          <a:spcPts val="0"/>
+                        </a:spcAft>
+                      </a:pPr>
+                      <a:r>
+                        <a:rPr lang="en-US" sz="800" kern="0">
+                          <a:effectLst/>
+                        </a:rPr>
+                        <a:t>The Dream Team of NLP</a:t>
+                      </a:r>
+                      <a:endParaRPr lang="en-CA" sz="700" kern="100">
+                        <a:effectLst/>
+                        <a:latin typeface="DengXian" panose="02010600030101010101" pitchFamily="2" charset="-122"/>
+                        <a:ea typeface="DengXian" panose="02010600030101010101" pitchFamily="2" charset="-122"/>
+                        <a:cs typeface="Times New Roman" panose="02020603050405020304" pitchFamily="18" charset="0"/>
+                      </a:endParaRPr>
+                    </a:p>
+                  </a:txBody>
+                  <a:tcPr marL="46358" marR="46358" marT="0" marB="0" anchor="ctr"/>
+                </a:tc>
+                <a:tc>
+                  <a:txBody>
+                    <a:bodyPr/>
+                    <a:lstStyle/>
+                    <a:p>
+                      <a:pPr algn="ctr">
+                        <a:spcAft>
+                          <a:spcPts val="0"/>
+                        </a:spcAft>
+                      </a:pPr>
+                      <a:r>
+                        <a:rPr lang="en-US" sz="800" kern="0">
+                          <a:effectLst/>
+                        </a:rPr>
+                        <a:t>0.480</a:t>
+                      </a:r>
+                      <a:endParaRPr lang="en-CA" sz="700" kern="100">
+                        <a:effectLst/>
+                        <a:latin typeface="DengXian" panose="02010600030101010101" pitchFamily="2" charset="-122"/>
+                        <a:ea typeface="DengXian" panose="02010600030101010101" pitchFamily="2" charset="-122"/>
+                        <a:cs typeface="Times New Roman" panose="02020603050405020304" pitchFamily="18" charset="0"/>
+                      </a:endParaRPr>
+                    </a:p>
+                  </a:txBody>
+                  <a:tcPr marL="46358" marR="46358" marT="0" marB="0" anchor="ctr"/>
+                </a:tc>
+                <a:tc>
+                  <a:txBody>
+                    <a:bodyPr/>
+                    <a:lstStyle/>
+                    <a:p>
+                      <a:pPr algn="ctr">
+                        <a:spcAft>
+                          <a:spcPts val="0"/>
+                        </a:spcAft>
+                      </a:pPr>
+                      <a:r>
+                        <a:rPr lang="en-US" sz="800" kern="0">
+                          <a:effectLst/>
+                        </a:rPr>
+                        <a:t>0.350</a:t>
+                      </a:r>
+                      <a:endParaRPr lang="en-CA" sz="700" kern="100">
+                        <a:effectLst/>
+                        <a:latin typeface="DengXian" panose="02010600030101010101" pitchFamily="2" charset="-122"/>
+                        <a:ea typeface="DengXian" panose="02010600030101010101" pitchFamily="2" charset="-122"/>
+                        <a:cs typeface="Times New Roman" panose="02020603050405020304" pitchFamily="18" charset="0"/>
+                      </a:endParaRPr>
+                    </a:p>
+                  </a:txBody>
+                  <a:tcPr marL="46358" marR="46358" marT="0" marB="0" anchor="ctr"/>
+                </a:tc>
+                <a:tc>
+                  <a:txBody>
+                    <a:bodyPr/>
+                    <a:lstStyle/>
+                    <a:p>
+                      <a:pPr algn="ctr">
+                        <a:spcAft>
+                          <a:spcPts val="0"/>
+                        </a:spcAft>
+                      </a:pPr>
+                      <a:r>
+                        <a:rPr lang="en-US" sz="800" kern="0">
+                          <a:effectLst/>
+                        </a:rPr>
+                        <a:t>0.160</a:t>
+                      </a:r>
+                      <a:endParaRPr lang="en-CA" sz="700" kern="100">
+                        <a:effectLst/>
+                        <a:latin typeface="DengXian" panose="02010600030101010101" pitchFamily="2" charset="-122"/>
+                        <a:ea typeface="DengXian" panose="02010600030101010101" pitchFamily="2" charset="-122"/>
+                        <a:cs typeface="Times New Roman" panose="02020603050405020304" pitchFamily="18" charset="0"/>
+                      </a:endParaRPr>
+                    </a:p>
+                  </a:txBody>
+                  <a:tcPr marL="46358" marR="46358" marT="0" marB="0" anchor="ctr"/>
+                </a:tc>
+                <a:tc>
+                  <a:txBody>
+                    <a:bodyPr/>
+                    <a:lstStyle/>
+                    <a:p>
+                      <a:pPr algn="ctr">
+                        <a:spcAft>
+                          <a:spcPts val="0"/>
+                        </a:spcAft>
+                      </a:pPr>
+                      <a:r>
+                        <a:rPr lang="en-US" sz="800" kern="0">
+                          <a:effectLst/>
+                        </a:rPr>
+                        <a:t>0.062</a:t>
+                      </a:r>
+                      <a:endParaRPr lang="en-CA" sz="700" kern="100">
+                        <a:effectLst/>
+                        <a:latin typeface="DengXian" panose="02010600030101010101" pitchFamily="2" charset="-122"/>
+                        <a:ea typeface="DengXian" panose="02010600030101010101" pitchFamily="2" charset="-122"/>
+                        <a:cs typeface="Times New Roman" panose="02020603050405020304" pitchFamily="18" charset="0"/>
+                      </a:endParaRPr>
+                    </a:p>
+                  </a:txBody>
+                  <a:tcPr marL="46358" marR="46358" marT="0" marB="0" anchor="ctr"/>
+                </a:tc>
+                <a:tc>
+                  <a:txBody>
+                    <a:bodyPr/>
+                    <a:lstStyle/>
+                    <a:p>
+                      <a:pPr algn="ctr">
+                        <a:spcAft>
+                          <a:spcPts val="0"/>
+                        </a:spcAft>
+                      </a:pPr>
+                      <a:r>
+                        <a:rPr lang="en-US" sz="800" kern="0">
+                          <a:effectLst/>
+                        </a:rPr>
+                        <a:t>0.137</a:t>
+                      </a:r>
+                      <a:endParaRPr lang="en-CA" sz="700" kern="100">
+                        <a:effectLst/>
+                        <a:latin typeface="DengXian" panose="02010600030101010101" pitchFamily="2" charset="-122"/>
+                        <a:ea typeface="DengXian" panose="02010600030101010101" pitchFamily="2" charset="-122"/>
+                        <a:cs typeface="Times New Roman" panose="02020603050405020304" pitchFamily="18" charset="0"/>
+                      </a:endParaRPr>
+                    </a:p>
+                  </a:txBody>
+                  <a:tcPr marL="46358" marR="46358" marT="0" marB="0" anchor="ctr"/>
+                </a:tc>
+                <a:tc>
+                  <a:txBody>
+                    <a:bodyPr/>
+                    <a:lstStyle/>
+                    <a:p>
+                      <a:pPr algn="ctr">
+                        <a:spcAft>
+                          <a:spcPts val="0"/>
+                        </a:spcAft>
+                      </a:pPr>
+                      <a:r>
+                        <a:rPr lang="en-US" sz="800" kern="0">
+                          <a:effectLst/>
+                        </a:rPr>
+                        <a:t>0.238</a:t>
+                      </a:r>
+                      <a:endParaRPr lang="en-CA" sz="700" kern="100">
+                        <a:effectLst/>
+                        <a:latin typeface="DengXian" panose="02010600030101010101" pitchFamily="2" charset="-122"/>
+                        <a:ea typeface="DengXian" panose="02010600030101010101" pitchFamily="2" charset="-122"/>
+                        <a:cs typeface="Times New Roman" panose="02020603050405020304" pitchFamily="18" charset="0"/>
+                      </a:endParaRPr>
+                    </a:p>
+                  </a:txBody>
+                  <a:tcPr marL="46358" marR="46358" marT="0" marB="0" anchor="ctr"/>
+                </a:tc>
+                <a:extLst>
+                  <a:ext uri="{0D108BD9-81ED-4DB2-BD59-A6C34878D82A}">
+                    <a16:rowId xmlns:a16="http://schemas.microsoft.com/office/drawing/2014/main" val="593866933"/>
+                  </a:ext>
+                </a:extLst>
+              </a:tr>
+              <a:tr h="195276">
+                <a:tc>
+                  <a:txBody>
+                    <a:bodyPr/>
+                    <a:lstStyle/>
+                    <a:p>
+                      <a:pPr algn="ctr">
+                        <a:spcAft>
+                          <a:spcPts val="0"/>
+                        </a:spcAft>
+                      </a:pPr>
+                      <a:r>
+                        <a:rPr lang="en-US" sz="800" kern="0">
+                          <a:effectLst/>
+                        </a:rPr>
+                        <a:t>GDUFSLEC</a:t>
+                      </a:r>
+                      <a:endParaRPr lang="en-CA" sz="700" kern="100">
+                        <a:effectLst/>
+                        <a:latin typeface="DengXian" panose="02010600030101010101" pitchFamily="2" charset="-122"/>
+                        <a:ea typeface="DengXian" panose="02010600030101010101" pitchFamily="2" charset="-122"/>
+                        <a:cs typeface="Times New Roman" panose="02020603050405020304" pitchFamily="18" charset="0"/>
+                      </a:endParaRPr>
+                    </a:p>
+                  </a:txBody>
+                  <a:tcPr marL="46358" marR="46358" marT="0" marB="0" anchor="ctr"/>
+                </a:tc>
+                <a:tc>
+                  <a:txBody>
+                    <a:bodyPr/>
+                    <a:lstStyle/>
+                    <a:p>
+                      <a:pPr algn="ctr">
+                        <a:spcAft>
+                          <a:spcPts val="0"/>
+                        </a:spcAft>
+                      </a:pPr>
+                      <a:r>
+                        <a:rPr lang="en-US" sz="800" kern="0">
+                          <a:effectLst/>
+                        </a:rPr>
+                        <a:t>0.491</a:t>
+                      </a:r>
+                      <a:endParaRPr lang="en-CA" sz="700" kern="100">
+                        <a:effectLst/>
+                        <a:latin typeface="DengXian" panose="02010600030101010101" pitchFamily="2" charset="-122"/>
+                        <a:ea typeface="DengXian" panose="02010600030101010101" pitchFamily="2" charset="-122"/>
+                        <a:cs typeface="Times New Roman" panose="02020603050405020304" pitchFamily="18" charset="0"/>
+                      </a:endParaRPr>
+                    </a:p>
+                  </a:txBody>
+                  <a:tcPr marL="46358" marR="46358" marT="0" marB="0" anchor="ctr"/>
+                </a:tc>
+                <a:tc>
+                  <a:txBody>
+                    <a:bodyPr/>
+                    <a:lstStyle/>
+                    <a:p>
+                      <a:pPr algn="ctr">
+                        <a:spcAft>
+                          <a:spcPts val="0"/>
+                        </a:spcAft>
+                      </a:pPr>
+                      <a:r>
+                        <a:rPr lang="en-US" sz="800" kern="0">
+                          <a:effectLst/>
+                        </a:rPr>
+                        <a:t>0.131</a:t>
+                      </a:r>
+                      <a:endParaRPr lang="en-CA" sz="700" kern="100">
+                        <a:effectLst/>
+                        <a:latin typeface="DengXian" panose="02010600030101010101" pitchFamily="2" charset="-122"/>
+                        <a:ea typeface="DengXian" panose="02010600030101010101" pitchFamily="2" charset="-122"/>
+                        <a:cs typeface="Times New Roman" panose="02020603050405020304" pitchFamily="18" charset="0"/>
+                      </a:endParaRPr>
+                    </a:p>
+                  </a:txBody>
+                  <a:tcPr marL="46358" marR="46358" marT="0" marB="0" anchor="ctr"/>
+                </a:tc>
+                <a:tc>
+                  <a:txBody>
+                    <a:bodyPr/>
+                    <a:lstStyle/>
+                    <a:p>
+                      <a:pPr algn="ctr">
+                        <a:spcAft>
+                          <a:spcPts val="0"/>
+                        </a:spcAft>
+                      </a:pPr>
+                      <a:r>
+                        <a:rPr lang="en-US" sz="800" kern="0">
+                          <a:effectLst/>
+                        </a:rPr>
+                        <a:t>0.190</a:t>
+                      </a:r>
+                      <a:endParaRPr lang="en-CA" sz="700" kern="100">
+                        <a:effectLst/>
+                        <a:latin typeface="DengXian" panose="02010600030101010101" pitchFamily="2" charset="-122"/>
+                        <a:ea typeface="DengXian" panose="02010600030101010101" pitchFamily="2" charset="-122"/>
+                        <a:cs typeface="Times New Roman" panose="02020603050405020304" pitchFamily="18" charset="0"/>
+                      </a:endParaRPr>
+                    </a:p>
+                  </a:txBody>
+                  <a:tcPr marL="46358" marR="46358" marT="0" marB="0" anchor="ctr"/>
+                </a:tc>
+                <a:tc>
+                  <a:txBody>
+                    <a:bodyPr/>
+                    <a:lstStyle/>
+                    <a:p>
+                      <a:pPr algn="ctr">
+                        <a:spcAft>
+                          <a:spcPts val="0"/>
+                        </a:spcAft>
+                      </a:pPr>
+                      <a:r>
+                        <a:rPr lang="en-US" sz="800" kern="0">
+                          <a:effectLst/>
+                        </a:rPr>
+                        <a:t>0.045</a:t>
+                      </a:r>
+                      <a:endParaRPr lang="en-CA" sz="700" kern="100">
+                        <a:effectLst/>
+                        <a:latin typeface="DengXian" panose="02010600030101010101" pitchFamily="2" charset="-122"/>
+                        <a:ea typeface="DengXian" panose="02010600030101010101" pitchFamily="2" charset="-122"/>
+                        <a:cs typeface="Times New Roman" panose="02020603050405020304" pitchFamily="18" charset="0"/>
+                      </a:endParaRPr>
+                    </a:p>
+                  </a:txBody>
+                  <a:tcPr marL="46358" marR="46358" marT="0" marB="0" anchor="ctr"/>
+                </a:tc>
+                <a:tc>
+                  <a:txBody>
+                    <a:bodyPr/>
+                    <a:lstStyle/>
+                    <a:p>
+                      <a:pPr algn="ctr">
+                        <a:spcAft>
+                          <a:spcPts val="0"/>
+                        </a:spcAft>
+                      </a:pPr>
+                      <a:r>
+                        <a:rPr lang="en-US" sz="800" kern="0">
+                          <a:effectLst/>
+                        </a:rPr>
+                        <a:t>0.299</a:t>
+                      </a:r>
+                      <a:endParaRPr lang="en-CA" sz="700" kern="100">
+                        <a:effectLst/>
+                        <a:latin typeface="DengXian" panose="02010600030101010101" pitchFamily="2" charset="-122"/>
+                        <a:ea typeface="DengXian" panose="02010600030101010101" pitchFamily="2" charset="-122"/>
+                        <a:cs typeface="Times New Roman" panose="02020603050405020304" pitchFamily="18" charset="0"/>
+                      </a:endParaRPr>
+                    </a:p>
+                  </a:txBody>
+                  <a:tcPr marL="46358" marR="46358" marT="0" marB="0" anchor="ctr"/>
+                </a:tc>
+                <a:tc>
+                  <a:txBody>
+                    <a:bodyPr/>
+                    <a:lstStyle/>
+                    <a:p>
+                      <a:pPr algn="ctr">
+                        <a:spcAft>
+                          <a:spcPts val="0"/>
+                        </a:spcAft>
+                      </a:pPr>
+                      <a:r>
+                        <a:rPr lang="en-US" sz="800" kern="0" dirty="0">
+                          <a:effectLst/>
+                        </a:rPr>
+                        <a:t>0.231</a:t>
+                      </a:r>
+                      <a:endParaRPr lang="en-CA" sz="700" kern="100" dirty="0">
+                        <a:effectLst/>
+                        <a:latin typeface="DengXian" panose="02010600030101010101" pitchFamily="2" charset="-122"/>
+                        <a:ea typeface="DengXian" panose="02010600030101010101" pitchFamily="2" charset="-122"/>
+                        <a:cs typeface="Times New Roman" panose="02020603050405020304" pitchFamily="18" charset="0"/>
+                      </a:endParaRPr>
+                    </a:p>
+                  </a:txBody>
+                  <a:tcPr marL="46358" marR="46358" marT="0" marB="0" anchor="ctr"/>
+                </a:tc>
+                <a:extLst>
+                  <a:ext uri="{0D108BD9-81ED-4DB2-BD59-A6C34878D82A}">
+                    <a16:rowId xmlns:a16="http://schemas.microsoft.com/office/drawing/2014/main" val="359748272"/>
+                  </a:ext>
+                </a:extLst>
+              </a:tr>
+              <a:tr h="195276">
+                <a:tc>
+                  <a:txBody>
+                    <a:bodyPr/>
+                    <a:lstStyle/>
+                    <a:p>
+                      <a:pPr algn="ctr">
+                        <a:spcAft>
+                          <a:spcPts val="0"/>
+                        </a:spcAft>
+                      </a:pPr>
+                      <a:r>
+                        <a:rPr lang="en-US" sz="800" kern="0">
+                          <a:effectLst/>
+                        </a:rPr>
+                        <a:t>CSUNLP</a:t>
+                      </a:r>
+                      <a:endParaRPr lang="en-CA" sz="700" kern="100">
+                        <a:effectLst/>
+                        <a:latin typeface="DengXian" panose="02010600030101010101" pitchFamily="2" charset="-122"/>
+                        <a:ea typeface="DengXian" panose="02010600030101010101" pitchFamily="2" charset="-122"/>
+                        <a:cs typeface="Times New Roman" panose="02020603050405020304" pitchFamily="18" charset="0"/>
+                      </a:endParaRPr>
+                    </a:p>
+                  </a:txBody>
+                  <a:tcPr marL="46358" marR="46358" marT="0" marB="0" anchor="ctr"/>
+                </a:tc>
+                <a:tc>
+                  <a:txBody>
+                    <a:bodyPr/>
+                    <a:lstStyle/>
+                    <a:p>
+                      <a:pPr algn="ctr">
+                        <a:spcAft>
+                          <a:spcPts val="0"/>
+                        </a:spcAft>
+                      </a:pPr>
+                      <a:r>
+                        <a:rPr lang="en-US" sz="800" kern="0">
+                          <a:effectLst/>
+                        </a:rPr>
+                        <a:t>0.441</a:t>
+                      </a:r>
+                      <a:endParaRPr lang="en-CA" sz="700" kern="100">
+                        <a:effectLst/>
+                        <a:latin typeface="DengXian" panose="02010600030101010101" pitchFamily="2" charset="-122"/>
+                        <a:ea typeface="DengXian" panose="02010600030101010101" pitchFamily="2" charset="-122"/>
+                        <a:cs typeface="Times New Roman" panose="02020603050405020304" pitchFamily="18" charset="0"/>
+                      </a:endParaRPr>
+                    </a:p>
+                  </a:txBody>
+                  <a:tcPr marL="46358" marR="46358" marT="0" marB="0" anchor="ctr"/>
+                </a:tc>
+                <a:tc>
+                  <a:txBody>
+                    <a:bodyPr/>
+                    <a:lstStyle/>
+                    <a:p>
+                      <a:pPr algn="ctr">
+                        <a:spcAft>
+                          <a:spcPts val="0"/>
+                        </a:spcAft>
+                      </a:pPr>
+                      <a:r>
+                        <a:rPr lang="en-US" sz="800" kern="0">
+                          <a:effectLst/>
+                        </a:rPr>
+                        <a:t>0.354</a:t>
+                      </a:r>
+                      <a:endParaRPr lang="en-CA" sz="700" kern="100">
+                        <a:effectLst/>
+                        <a:latin typeface="DengXian" panose="02010600030101010101" pitchFamily="2" charset="-122"/>
+                        <a:ea typeface="DengXian" panose="02010600030101010101" pitchFamily="2" charset="-122"/>
+                        <a:cs typeface="Times New Roman" panose="02020603050405020304" pitchFamily="18" charset="0"/>
+                      </a:endParaRPr>
+                    </a:p>
+                  </a:txBody>
+                  <a:tcPr marL="46358" marR="46358" marT="0" marB="0" anchor="ctr"/>
+                </a:tc>
+                <a:tc>
+                  <a:txBody>
+                    <a:bodyPr/>
+                    <a:lstStyle/>
+                    <a:p>
+                      <a:pPr algn="ctr">
+                        <a:spcAft>
+                          <a:spcPts val="0"/>
+                        </a:spcAft>
+                      </a:pPr>
+                      <a:r>
+                        <a:rPr lang="en-US" sz="800" kern="0">
+                          <a:effectLst/>
+                        </a:rPr>
+                        <a:t>0.033</a:t>
+                      </a:r>
+                      <a:endParaRPr lang="en-CA" sz="700" kern="100">
+                        <a:effectLst/>
+                        <a:latin typeface="DengXian" panose="02010600030101010101" pitchFamily="2" charset="-122"/>
+                        <a:ea typeface="DengXian" panose="02010600030101010101" pitchFamily="2" charset="-122"/>
+                        <a:cs typeface="Times New Roman" panose="02020603050405020304" pitchFamily="18" charset="0"/>
+                      </a:endParaRPr>
+                    </a:p>
+                  </a:txBody>
+                  <a:tcPr marL="46358" marR="46358" marT="0" marB="0" anchor="ctr"/>
+                </a:tc>
+                <a:tc>
+                  <a:txBody>
+                    <a:bodyPr/>
+                    <a:lstStyle/>
+                    <a:p>
+                      <a:pPr algn="ctr">
+                        <a:spcAft>
+                          <a:spcPts val="0"/>
+                        </a:spcAft>
+                      </a:pPr>
+                      <a:r>
+                        <a:rPr lang="en-US" sz="800" kern="0">
+                          <a:effectLst/>
+                        </a:rPr>
+                        <a:t>0.093</a:t>
+                      </a:r>
+                      <a:endParaRPr lang="en-CA" sz="700" kern="100">
+                        <a:effectLst/>
+                        <a:latin typeface="DengXian" panose="02010600030101010101" pitchFamily="2" charset="-122"/>
+                        <a:ea typeface="DengXian" panose="02010600030101010101" pitchFamily="2" charset="-122"/>
+                        <a:cs typeface="Times New Roman" panose="02020603050405020304" pitchFamily="18" charset="0"/>
+                      </a:endParaRPr>
+                    </a:p>
+                  </a:txBody>
+                  <a:tcPr marL="46358" marR="46358" marT="0" marB="0" anchor="ctr"/>
+                </a:tc>
+                <a:tc>
+                  <a:txBody>
+                    <a:bodyPr/>
+                    <a:lstStyle/>
+                    <a:p>
+                      <a:pPr algn="ctr">
+                        <a:spcAft>
+                          <a:spcPts val="0"/>
+                        </a:spcAft>
+                      </a:pPr>
+                      <a:r>
+                        <a:rPr lang="en-US" sz="800" kern="0">
+                          <a:effectLst/>
+                        </a:rPr>
+                        <a:t>0.149</a:t>
+                      </a:r>
+                      <a:endParaRPr lang="en-CA" sz="700" kern="100">
+                        <a:effectLst/>
+                        <a:latin typeface="DengXian" panose="02010600030101010101" pitchFamily="2" charset="-122"/>
+                        <a:ea typeface="DengXian" panose="02010600030101010101" pitchFamily="2" charset="-122"/>
+                        <a:cs typeface="Times New Roman" panose="02020603050405020304" pitchFamily="18" charset="0"/>
+                      </a:endParaRPr>
+                    </a:p>
+                  </a:txBody>
+                  <a:tcPr marL="46358" marR="46358" marT="0" marB="0" anchor="ctr"/>
+                </a:tc>
+                <a:tc>
+                  <a:txBody>
+                    <a:bodyPr/>
+                    <a:lstStyle/>
+                    <a:p>
+                      <a:pPr algn="ctr">
+                        <a:spcAft>
+                          <a:spcPts val="0"/>
+                        </a:spcAft>
+                      </a:pPr>
+                      <a:r>
+                        <a:rPr lang="en-US" sz="800" kern="0" dirty="0">
+                          <a:effectLst/>
+                        </a:rPr>
+                        <a:t>0.214</a:t>
+                      </a:r>
+                      <a:endParaRPr lang="en-CA" sz="700" kern="100" dirty="0">
+                        <a:effectLst/>
+                        <a:latin typeface="DengXian" panose="02010600030101010101" pitchFamily="2" charset="-122"/>
+                        <a:ea typeface="DengXian" panose="02010600030101010101" pitchFamily="2" charset="-122"/>
+                        <a:cs typeface="Times New Roman" panose="02020603050405020304" pitchFamily="18" charset="0"/>
+                      </a:endParaRPr>
+                    </a:p>
+                  </a:txBody>
+                  <a:tcPr marL="46358" marR="46358" marT="0" marB="0" anchor="ctr"/>
+                </a:tc>
+                <a:extLst>
+                  <a:ext uri="{0D108BD9-81ED-4DB2-BD59-A6C34878D82A}">
+                    <a16:rowId xmlns:a16="http://schemas.microsoft.com/office/drawing/2014/main" val="1765727979"/>
+                  </a:ext>
+                </a:extLst>
+              </a:tr>
+              <a:tr h="195276">
+                <a:tc>
+                  <a:txBody>
+                    <a:bodyPr/>
+                    <a:lstStyle/>
+                    <a:p>
+                      <a:pPr algn="ctr">
+                        <a:spcAft>
+                          <a:spcPts val="0"/>
+                        </a:spcAft>
+                      </a:pPr>
+                      <a:r>
+                        <a:rPr lang="en-US" sz="800" kern="0">
+                          <a:effectLst/>
+                        </a:rPr>
+                        <a:t>CQUT_301_1</a:t>
+                      </a:r>
+                      <a:endParaRPr lang="en-CA" sz="700" kern="100">
+                        <a:effectLst/>
+                        <a:latin typeface="DengXian" panose="02010600030101010101" pitchFamily="2" charset="-122"/>
+                        <a:ea typeface="DengXian" panose="02010600030101010101" pitchFamily="2" charset="-122"/>
+                        <a:cs typeface="Times New Roman" panose="02020603050405020304" pitchFamily="18" charset="0"/>
+                      </a:endParaRPr>
+                    </a:p>
+                  </a:txBody>
+                  <a:tcPr marL="46358" marR="46358" marT="0" marB="0" anchor="ctr"/>
+                </a:tc>
+                <a:tc>
+                  <a:txBody>
+                    <a:bodyPr/>
+                    <a:lstStyle/>
+                    <a:p>
+                      <a:pPr algn="ctr">
+                        <a:spcAft>
+                          <a:spcPts val="0"/>
+                        </a:spcAft>
+                      </a:pPr>
+                      <a:r>
+                        <a:rPr lang="en-US" sz="800" kern="0">
+                          <a:effectLst/>
+                        </a:rPr>
+                        <a:t>0.246</a:t>
+                      </a:r>
+                      <a:endParaRPr lang="en-CA" sz="700" kern="100">
+                        <a:effectLst/>
+                        <a:latin typeface="DengXian" panose="02010600030101010101" pitchFamily="2" charset="-122"/>
+                        <a:ea typeface="DengXian" panose="02010600030101010101" pitchFamily="2" charset="-122"/>
+                        <a:cs typeface="Times New Roman" panose="02020603050405020304" pitchFamily="18" charset="0"/>
+                      </a:endParaRPr>
+                    </a:p>
+                  </a:txBody>
+                  <a:tcPr marL="46358" marR="46358" marT="0" marB="0" anchor="ctr"/>
+                </a:tc>
+                <a:tc>
+                  <a:txBody>
+                    <a:bodyPr/>
+                    <a:lstStyle/>
+                    <a:p>
+                      <a:pPr algn="ctr">
+                        <a:spcAft>
+                          <a:spcPts val="0"/>
+                        </a:spcAft>
+                      </a:pPr>
+                      <a:r>
+                        <a:rPr lang="en-US" sz="800" kern="0">
+                          <a:effectLst/>
+                        </a:rPr>
+                        <a:t>0.161</a:t>
+                      </a:r>
+                      <a:endParaRPr lang="en-CA" sz="700" kern="100">
+                        <a:effectLst/>
+                        <a:latin typeface="DengXian" panose="02010600030101010101" pitchFamily="2" charset="-122"/>
+                        <a:ea typeface="DengXian" panose="02010600030101010101" pitchFamily="2" charset="-122"/>
+                        <a:cs typeface="Times New Roman" panose="02020603050405020304" pitchFamily="18" charset="0"/>
+                      </a:endParaRPr>
+                    </a:p>
+                  </a:txBody>
+                  <a:tcPr marL="46358" marR="46358" marT="0" marB="0" anchor="ctr"/>
+                </a:tc>
+                <a:tc>
+                  <a:txBody>
+                    <a:bodyPr/>
+                    <a:lstStyle/>
+                    <a:p>
+                      <a:pPr algn="ctr">
+                        <a:spcAft>
+                          <a:spcPts val="0"/>
+                        </a:spcAft>
+                      </a:pPr>
+                      <a:r>
+                        <a:rPr lang="en-US" sz="800" kern="0">
+                          <a:effectLst/>
+                        </a:rPr>
+                        <a:t>0.093</a:t>
+                      </a:r>
+                      <a:endParaRPr lang="en-CA" sz="700" kern="100">
+                        <a:effectLst/>
+                        <a:latin typeface="DengXian" panose="02010600030101010101" pitchFamily="2" charset="-122"/>
+                        <a:ea typeface="DengXian" panose="02010600030101010101" pitchFamily="2" charset="-122"/>
+                        <a:cs typeface="Times New Roman" panose="02020603050405020304" pitchFamily="18" charset="0"/>
+                      </a:endParaRPr>
+                    </a:p>
+                  </a:txBody>
+                  <a:tcPr marL="46358" marR="46358" marT="0" marB="0" anchor="ctr"/>
+                </a:tc>
+                <a:tc>
+                  <a:txBody>
+                    <a:bodyPr/>
+                    <a:lstStyle/>
+                    <a:p>
+                      <a:pPr algn="ctr">
+                        <a:spcAft>
+                          <a:spcPts val="0"/>
+                        </a:spcAft>
+                      </a:pPr>
+                      <a:r>
+                        <a:rPr lang="en-US" sz="800" kern="0">
+                          <a:effectLst/>
+                        </a:rPr>
+                        <a:t>0.053</a:t>
+                      </a:r>
+                      <a:endParaRPr lang="en-CA" sz="700" kern="100">
+                        <a:effectLst/>
+                        <a:latin typeface="DengXian" panose="02010600030101010101" pitchFamily="2" charset="-122"/>
+                        <a:ea typeface="DengXian" panose="02010600030101010101" pitchFamily="2" charset="-122"/>
+                        <a:cs typeface="Times New Roman" panose="02020603050405020304" pitchFamily="18" charset="0"/>
+                      </a:endParaRPr>
+                    </a:p>
+                  </a:txBody>
+                  <a:tcPr marL="46358" marR="46358" marT="0" marB="0" anchor="ctr"/>
+                </a:tc>
+                <a:tc>
+                  <a:txBody>
+                    <a:bodyPr/>
+                    <a:lstStyle/>
+                    <a:p>
+                      <a:pPr algn="ctr">
+                        <a:spcAft>
+                          <a:spcPts val="0"/>
+                        </a:spcAft>
+                      </a:pPr>
+                      <a:r>
+                        <a:rPr lang="en-US" sz="800" kern="0">
+                          <a:effectLst/>
+                        </a:rPr>
+                        <a:t>0.049</a:t>
+                      </a:r>
+                      <a:endParaRPr lang="en-CA" sz="700" kern="100">
+                        <a:effectLst/>
+                        <a:latin typeface="DengXian" panose="02010600030101010101" pitchFamily="2" charset="-122"/>
+                        <a:ea typeface="DengXian" panose="02010600030101010101" pitchFamily="2" charset="-122"/>
+                        <a:cs typeface="Times New Roman" panose="02020603050405020304" pitchFamily="18" charset="0"/>
+                      </a:endParaRPr>
+                    </a:p>
+                  </a:txBody>
+                  <a:tcPr marL="46358" marR="46358" marT="0" marB="0" anchor="ctr"/>
+                </a:tc>
+                <a:tc>
+                  <a:txBody>
+                    <a:bodyPr/>
+                    <a:lstStyle/>
+                    <a:p>
+                      <a:pPr algn="ctr">
+                        <a:spcAft>
+                          <a:spcPts val="0"/>
+                        </a:spcAft>
+                      </a:pPr>
+                      <a:r>
+                        <a:rPr lang="en-US" sz="800" kern="0" dirty="0">
+                          <a:effectLst/>
+                        </a:rPr>
+                        <a:t>0.121</a:t>
+                      </a:r>
+                      <a:endParaRPr lang="en-CA" sz="700" kern="100" dirty="0">
+                        <a:effectLst/>
+                        <a:latin typeface="DengXian" panose="02010600030101010101" pitchFamily="2" charset="-122"/>
+                        <a:ea typeface="DengXian" panose="02010600030101010101" pitchFamily="2" charset="-122"/>
+                        <a:cs typeface="Times New Roman" panose="02020603050405020304" pitchFamily="18" charset="0"/>
+                      </a:endParaRPr>
+                    </a:p>
+                  </a:txBody>
+                  <a:tcPr marL="46358" marR="46358" marT="0" marB="0" anchor="ctr"/>
+                </a:tc>
+                <a:extLst>
+                  <a:ext uri="{0D108BD9-81ED-4DB2-BD59-A6C34878D82A}">
+                    <a16:rowId xmlns:a16="http://schemas.microsoft.com/office/drawing/2014/main" val="1834478020"/>
+                  </a:ext>
+                </a:extLst>
+              </a:tr>
+              <a:tr h="195276">
+                <a:tc>
+                  <a:txBody>
+                    <a:bodyPr/>
+                    <a:lstStyle/>
+                    <a:p>
+                      <a:pPr algn="ctr">
+                        <a:spcAft>
+                          <a:spcPts val="0"/>
+                        </a:spcAft>
+                      </a:pPr>
+                      <a:r>
+                        <a:rPr lang="en-US" sz="800" kern="0">
+                          <a:effectLst/>
+                        </a:rPr>
+                        <a:t>BISTU_IIPI</a:t>
+                      </a:r>
+                      <a:endParaRPr lang="en-CA" sz="700" kern="100">
+                        <a:effectLst/>
+                        <a:latin typeface="DengXian" panose="02010600030101010101" pitchFamily="2" charset="-122"/>
+                        <a:ea typeface="DengXian" panose="02010600030101010101" pitchFamily="2" charset="-122"/>
+                        <a:cs typeface="Times New Roman" panose="02020603050405020304" pitchFamily="18" charset="0"/>
+                      </a:endParaRPr>
+                    </a:p>
+                  </a:txBody>
+                  <a:tcPr marL="46358" marR="46358" marT="0" marB="0" anchor="ctr"/>
+                </a:tc>
+                <a:tc>
+                  <a:txBody>
+                    <a:bodyPr/>
+                    <a:lstStyle/>
+                    <a:p>
+                      <a:pPr algn="ctr">
+                        <a:spcAft>
+                          <a:spcPts val="0"/>
+                        </a:spcAft>
+                      </a:pPr>
+                      <a:r>
+                        <a:rPr lang="en-US" sz="800" kern="0">
+                          <a:effectLst/>
+                        </a:rPr>
+                        <a:t>0.456</a:t>
+                      </a:r>
+                      <a:endParaRPr lang="en-CA" sz="700" kern="100">
+                        <a:effectLst/>
+                        <a:latin typeface="DengXian" panose="02010600030101010101" pitchFamily="2" charset="-122"/>
+                        <a:ea typeface="DengXian" panose="02010600030101010101" pitchFamily="2" charset="-122"/>
+                        <a:cs typeface="Times New Roman" panose="02020603050405020304" pitchFamily="18" charset="0"/>
+                      </a:endParaRPr>
+                    </a:p>
+                  </a:txBody>
+                  <a:tcPr marL="46358" marR="46358" marT="0" marB="0" anchor="ctr"/>
+                </a:tc>
+                <a:tc>
+                  <a:txBody>
+                    <a:bodyPr/>
+                    <a:lstStyle/>
+                    <a:p>
+                      <a:pPr algn="ctr">
+                        <a:spcAft>
+                          <a:spcPts val="0"/>
+                        </a:spcAft>
+                      </a:pPr>
+                      <a:r>
+                        <a:rPr lang="en-US" sz="800" kern="0" dirty="0">
+                          <a:effectLst/>
+                        </a:rPr>
+                        <a:t>0.007</a:t>
+                      </a:r>
+                      <a:endParaRPr lang="en-CA" sz="700" kern="100" dirty="0">
+                        <a:effectLst/>
+                        <a:latin typeface="DengXian" panose="02010600030101010101" pitchFamily="2" charset="-122"/>
+                        <a:ea typeface="DengXian" panose="02010600030101010101" pitchFamily="2" charset="-122"/>
+                        <a:cs typeface="Times New Roman" panose="02020603050405020304" pitchFamily="18" charset="0"/>
+                      </a:endParaRPr>
+                    </a:p>
+                  </a:txBody>
+                  <a:tcPr marL="46358" marR="46358" marT="0" marB="0" anchor="ctr"/>
+                </a:tc>
+                <a:tc>
+                  <a:txBody>
+                    <a:bodyPr/>
+                    <a:lstStyle/>
+                    <a:p>
+                      <a:pPr algn="ctr">
+                        <a:spcAft>
+                          <a:spcPts val="0"/>
+                        </a:spcAft>
+                      </a:pPr>
+                      <a:r>
+                        <a:rPr lang="en-US" sz="800" kern="0">
+                          <a:effectLst/>
+                        </a:rPr>
+                        <a:t>0.018</a:t>
+                      </a:r>
+                      <a:endParaRPr lang="en-CA" sz="700" kern="100">
+                        <a:effectLst/>
+                        <a:latin typeface="DengXian" panose="02010600030101010101" pitchFamily="2" charset="-122"/>
+                        <a:ea typeface="DengXian" panose="02010600030101010101" pitchFamily="2" charset="-122"/>
+                        <a:cs typeface="Times New Roman" panose="02020603050405020304" pitchFamily="18" charset="0"/>
+                      </a:endParaRPr>
+                    </a:p>
+                  </a:txBody>
+                  <a:tcPr marL="46358" marR="46358" marT="0" marB="0" anchor="ctr"/>
+                </a:tc>
+                <a:tc>
+                  <a:txBody>
+                    <a:bodyPr/>
+                    <a:lstStyle/>
+                    <a:p>
+                      <a:pPr algn="ctr">
+                        <a:spcAft>
+                          <a:spcPts val="0"/>
+                        </a:spcAft>
+                      </a:pPr>
+                      <a:r>
+                        <a:rPr lang="en-US" sz="800" kern="0">
+                          <a:effectLst/>
+                        </a:rPr>
+                        <a:t>0.000</a:t>
+                      </a:r>
+                      <a:endParaRPr lang="en-CA" sz="700" kern="100">
+                        <a:effectLst/>
+                        <a:latin typeface="DengXian" panose="02010600030101010101" pitchFamily="2" charset="-122"/>
+                        <a:ea typeface="DengXian" panose="02010600030101010101" pitchFamily="2" charset="-122"/>
+                        <a:cs typeface="Times New Roman" panose="02020603050405020304" pitchFamily="18" charset="0"/>
+                      </a:endParaRPr>
+                    </a:p>
+                  </a:txBody>
+                  <a:tcPr marL="46358" marR="46358" marT="0" marB="0" anchor="ctr"/>
+                </a:tc>
+                <a:tc>
+                  <a:txBody>
+                    <a:bodyPr/>
+                    <a:lstStyle/>
+                    <a:p>
+                      <a:pPr algn="ctr">
+                        <a:spcAft>
+                          <a:spcPts val="0"/>
+                        </a:spcAft>
+                      </a:pPr>
+                      <a:r>
+                        <a:rPr lang="en-US" sz="800" kern="0">
+                          <a:effectLst/>
+                        </a:rPr>
+                        <a:t>0.000</a:t>
+                      </a:r>
+                      <a:endParaRPr lang="en-CA" sz="700" kern="100">
+                        <a:effectLst/>
+                        <a:latin typeface="DengXian" panose="02010600030101010101" pitchFamily="2" charset="-122"/>
+                        <a:ea typeface="DengXian" panose="02010600030101010101" pitchFamily="2" charset="-122"/>
+                        <a:cs typeface="Times New Roman" panose="02020603050405020304" pitchFamily="18" charset="0"/>
+                      </a:endParaRPr>
+                    </a:p>
+                  </a:txBody>
+                  <a:tcPr marL="46358" marR="46358" marT="0" marB="0" anchor="ctr"/>
+                </a:tc>
+                <a:tc>
+                  <a:txBody>
+                    <a:bodyPr/>
+                    <a:lstStyle/>
+                    <a:p>
+                      <a:pPr algn="ctr">
+                        <a:spcAft>
+                          <a:spcPts val="0"/>
+                        </a:spcAft>
+                      </a:pPr>
+                      <a:r>
+                        <a:rPr lang="en-US" sz="800" kern="0" dirty="0">
+                          <a:effectLst/>
+                        </a:rPr>
+                        <a:t>0.096</a:t>
+                      </a:r>
+                      <a:endParaRPr lang="en-CA" sz="700" kern="100" dirty="0">
+                        <a:effectLst/>
+                        <a:latin typeface="DengXian" panose="02010600030101010101" pitchFamily="2" charset="-122"/>
+                        <a:ea typeface="DengXian" panose="02010600030101010101" pitchFamily="2" charset="-122"/>
+                        <a:cs typeface="Times New Roman" panose="02020603050405020304" pitchFamily="18" charset="0"/>
+                      </a:endParaRPr>
+                    </a:p>
+                  </a:txBody>
+                  <a:tcPr marL="46358" marR="46358" marT="0" marB="0" anchor="ctr"/>
+                </a:tc>
+                <a:extLst>
+                  <a:ext uri="{0D108BD9-81ED-4DB2-BD59-A6C34878D82A}">
+                    <a16:rowId xmlns:a16="http://schemas.microsoft.com/office/drawing/2014/main" val="1027536720"/>
+                  </a:ext>
+                </a:extLst>
+              </a:tr>
+            </a:tbl>
+          </a:graphicData>
+        </a:graphic>
+      </p:graphicFrame>
     </p:spTree>
     <p:extLst>
       <p:ext uri="{BB962C8B-B14F-4D97-AF65-F5344CB8AC3E}">
@@ -7824,12 +11853,6 @@
 </file>
 
 <file path=customXml/item1.xml><?xml version="1.0" encoding="utf-8"?>
-<p:properties xmlns:p="http://schemas.microsoft.com/office/2006/metadata/properties" xmlns:xsi="http://www.w3.org/2001/XMLSchema-instance">
-  <documentManagement/>
-</p:properties>
-</file>
-
-<file path=customXml/item2.xml><?xml version="1.0" encoding="utf-8"?>
 <ct:contentTypeSchema xmlns:ct="http://schemas.microsoft.com/office/2006/metadata/contentType" xmlns:ma="http://schemas.microsoft.com/office/2006/metadata/properties/metaAttributes" ct:_="" ma:_="" ma:contentTypeName="Document" ma:contentTypeID="0x010100D26A3D6C04DFD740953BA1B2B9E62D60" ma:contentTypeVersion="0" ma:contentTypeDescription="Create a new document." ma:contentTypeScope="" ma:versionID="26617cd14cd3af163c0e97ff614e520a">
   <xsd:schema xmlns:xsd="http://www.w3.org/2001/XMLSchema" xmlns:xs="http://www.w3.org/2001/XMLSchema" xmlns:p="http://schemas.microsoft.com/office/2006/metadata/properties" targetNamespace="http://schemas.microsoft.com/office/2006/metadata/properties" ma:root="true" ma:fieldsID="c64490b4aec6201516c3a874156f37b2">
     <xsd:element name="properties">
@@ -7943,6 +11966,12 @@
 </ct:contentTypeSchema>
 </file>
 
+<file path=customXml/item2.xml><?xml version="1.0" encoding="utf-8"?>
+<p:properties xmlns:p="http://schemas.microsoft.com/office/2006/metadata/properties" xmlns:xsi="http://www.w3.org/2001/XMLSchema-instance">
+  <documentManagement/>
+</p:properties>
+</file>
+
 <file path=customXml/item3.xml><?xml version="1.0" encoding="utf-8"?>
 <?mso-contentType ?>
 <FormTemplates xmlns="http://schemas.microsoft.com/sharepoint/v3/contenttype/forms">
@@ -7953,21 +11982,6 @@
 </file>
 
 <file path=customXml/itemProps1.xml><?xml version="1.0" encoding="utf-8"?>
-<ds:datastoreItem xmlns:ds="http://schemas.openxmlformats.org/officeDocument/2006/customXml" ds:itemID="{C597C89A-FD0C-431E-81F6-90225B937683}">
-  <ds:schemaRefs>
-    <ds:schemaRef ds:uri="http://schemas.microsoft.com/office/infopath/2007/PartnerControls"/>
-    <ds:schemaRef ds:uri="http://www.w3.org/XML/1998/namespace"/>
-    <ds:schemaRef ds:uri="http://schemas.microsoft.com/office/2006/documentManagement/types"/>
-    <ds:schemaRef ds:uri="http://purl.org/dc/dcmitype/"/>
-    <ds:schemaRef ds:uri="http://schemas.openxmlformats.org/package/2006/metadata/core-properties"/>
-    <ds:schemaRef ds:uri="http://purl.org/dc/terms/"/>
-    <ds:schemaRef ds:uri="http://schemas.microsoft.com/office/2006/metadata/properties"/>
-    <ds:schemaRef ds:uri="http://purl.org/dc/elements/1.1/"/>
-  </ds:schemaRefs>
-</ds:datastoreItem>
-</file>
-
-<file path=customXml/itemProps2.xml><?xml version="1.0" encoding="utf-8"?>
 <ds:datastoreItem xmlns:ds="http://schemas.openxmlformats.org/officeDocument/2006/customXml" ds:itemID="{51A3258A-222C-4488-825E-7520D001FB75}">
   <ds:schemaRefs>
     <ds:schemaRef ds:uri="http://schemas.microsoft.com/office/2006/metadata/contentType"/>
@@ -7983,6 +11997,21 @@
 </ds:datastoreItem>
 </file>
 
+<file path=customXml/itemProps2.xml><?xml version="1.0" encoding="utf-8"?>
+<ds:datastoreItem xmlns:ds="http://schemas.openxmlformats.org/officeDocument/2006/customXml" ds:itemID="{C597C89A-FD0C-431E-81F6-90225B937683}">
+  <ds:schemaRefs>
+    <ds:schemaRef ds:uri="http://schemas.microsoft.com/office/infopath/2007/PartnerControls"/>
+    <ds:schemaRef ds:uri="http://www.w3.org/XML/1998/namespace"/>
+    <ds:schemaRef ds:uri="http://schemas.microsoft.com/office/2006/documentManagement/types"/>
+    <ds:schemaRef ds:uri="http://purl.org/dc/dcmitype/"/>
+    <ds:schemaRef ds:uri="http://schemas.openxmlformats.org/package/2006/metadata/core-properties"/>
+    <ds:schemaRef ds:uri="http://purl.org/dc/terms/"/>
+    <ds:schemaRef ds:uri="http://schemas.microsoft.com/office/2006/metadata/properties"/>
+    <ds:schemaRef ds:uri="http://purl.org/dc/elements/1.1/"/>
+  </ds:schemaRefs>
+</ds:datastoreItem>
+</file>
+
 <file path=customXml/itemProps3.xml><?xml version="1.0" encoding="utf-8"?>
 <ds:datastoreItem xmlns:ds="http://schemas.openxmlformats.org/officeDocument/2006/customXml" ds:itemID="{705B35A6-8B52-46A5-AE45-B98C6459DC10}">
   <ds:schemaRefs>

</xml_diff>

<commit_message>
Fix path and more information
</commit_message>
<xml_diff>
--- a/bicoded_sentiment_analysis/sentiment_anaysis.pptx
+++ b/bicoded_sentiment_analysis/sentiment_anaysis.pptx
@@ -5424,7 +5424,7 @@
           <a:p>
             <a:r>
               <a:rPr lang="en-US" dirty="0"/>
-              <a:t>Better encoder</a:t>
+              <a:t>Different model</a:t>
             </a:r>
           </a:p>
         </p:txBody>
@@ -5469,6 +5469,29 @@
                 <a:hlinkClick r:id="rId2"/>
               </a:rPr>
               <a:t>Example</a:t>
+            </a:r>
+            <a:endParaRPr lang="en-CA" dirty="0"/>
+          </a:p>
+          <a:p>
+            <a:pPr marL="342900" indent="-342900">
+              <a:buFont typeface="Arial" panose="020B0604020202020204" pitchFamily="34" charset="0"/>
+              <a:buChar char="•"/>
+            </a:pPr>
+            <a:r>
+              <a:rPr lang="en-CA" dirty="0"/>
+              <a:t>Use self-attentive models</a:t>
+            </a:r>
+          </a:p>
+          <a:p>
+            <a:pPr marL="1085850" lvl="1" indent="-342900">
+              <a:buFont typeface="Arial" panose="020B0604020202020204" pitchFamily="34" charset="0"/>
+              <a:buChar char="•"/>
+            </a:pPr>
+            <a:r>
+              <a:rPr lang="en-CA" dirty="0">
+                <a:hlinkClick r:id="rId3"/>
+              </a:rPr>
+              <a:t>Official tutorial</a:t>
             </a:r>
             <a:endParaRPr lang="en-US" dirty="0"/>
           </a:p>
@@ -11853,6 +11876,12 @@
 </file>
 
 <file path=customXml/item1.xml><?xml version="1.0" encoding="utf-8"?>
+<p:properties xmlns:p="http://schemas.microsoft.com/office/2006/metadata/properties" xmlns:xsi="http://www.w3.org/2001/XMLSchema-instance">
+  <documentManagement/>
+</p:properties>
+</file>
+
+<file path=customXml/item2.xml><?xml version="1.0" encoding="utf-8"?>
 <ct:contentTypeSchema xmlns:ct="http://schemas.microsoft.com/office/2006/metadata/contentType" xmlns:ma="http://schemas.microsoft.com/office/2006/metadata/properties/metaAttributes" ct:_="" ma:_="" ma:contentTypeName="Document" ma:contentTypeID="0x010100D26A3D6C04DFD740953BA1B2B9E62D60" ma:contentTypeVersion="0" ma:contentTypeDescription="Create a new document." ma:contentTypeScope="" ma:versionID="26617cd14cd3af163c0e97ff614e520a">
   <xsd:schema xmlns:xsd="http://www.w3.org/2001/XMLSchema" xmlns:xs="http://www.w3.org/2001/XMLSchema" xmlns:p="http://schemas.microsoft.com/office/2006/metadata/properties" targetNamespace="http://schemas.microsoft.com/office/2006/metadata/properties" ma:root="true" ma:fieldsID="c64490b4aec6201516c3a874156f37b2">
     <xsd:element name="properties">
@@ -11966,12 +11995,6 @@
 </ct:contentTypeSchema>
 </file>
 
-<file path=customXml/item2.xml><?xml version="1.0" encoding="utf-8"?>
-<p:properties xmlns:p="http://schemas.microsoft.com/office/2006/metadata/properties" xmlns:xsi="http://www.w3.org/2001/XMLSchema-instance">
-  <documentManagement/>
-</p:properties>
-</file>
-
 <file path=customXml/item3.xml><?xml version="1.0" encoding="utf-8"?>
 <?mso-contentType ?>
 <FormTemplates xmlns="http://schemas.microsoft.com/sharepoint/v3/contenttype/forms">
@@ -11982,6 +12005,21 @@
 </file>
 
 <file path=customXml/itemProps1.xml><?xml version="1.0" encoding="utf-8"?>
+<ds:datastoreItem xmlns:ds="http://schemas.openxmlformats.org/officeDocument/2006/customXml" ds:itemID="{C597C89A-FD0C-431E-81F6-90225B937683}">
+  <ds:schemaRefs>
+    <ds:schemaRef ds:uri="http://schemas.microsoft.com/office/infopath/2007/PartnerControls"/>
+    <ds:schemaRef ds:uri="http://www.w3.org/XML/1998/namespace"/>
+    <ds:schemaRef ds:uri="http://schemas.microsoft.com/office/2006/documentManagement/types"/>
+    <ds:schemaRef ds:uri="http://purl.org/dc/dcmitype/"/>
+    <ds:schemaRef ds:uri="http://schemas.openxmlformats.org/package/2006/metadata/core-properties"/>
+    <ds:schemaRef ds:uri="http://purl.org/dc/terms/"/>
+    <ds:schemaRef ds:uri="http://schemas.microsoft.com/office/2006/metadata/properties"/>
+    <ds:schemaRef ds:uri="http://purl.org/dc/elements/1.1/"/>
+  </ds:schemaRefs>
+</ds:datastoreItem>
+</file>
+
+<file path=customXml/itemProps2.xml><?xml version="1.0" encoding="utf-8"?>
 <ds:datastoreItem xmlns:ds="http://schemas.openxmlformats.org/officeDocument/2006/customXml" ds:itemID="{51A3258A-222C-4488-825E-7520D001FB75}">
   <ds:schemaRefs>
     <ds:schemaRef ds:uri="http://schemas.microsoft.com/office/2006/metadata/contentType"/>
@@ -11997,21 +12035,6 @@
 </ds:datastoreItem>
 </file>
 
-<file path=customXml/itemProps2.xml><?xml version="1.0" encoding="utf-8"?>
-<ds:datastoreItem xmlns:ds="http://schemas.openxmlformats.org/officeDocument/2006/customXml" ds:itemID="{C597C89A-FD0C-431E-81F6-90225B937683}">
-  <ds:schemaRefs>
-    <ds:schemaRef ds:uri="http://schemas.microsoft.com/office/infopath/2007/PartnerControls"/>
-    <ds:schemaRef ds:uri="http://www.w3.org/XML/1998/namespace"/>
-    <ds:schemaRef ds:uri="http://schemas.microsoft.com/office/2006/documentManagement/types"/>
-    <ds:schemaRef ds:uri="http://purl.org/dc/dcmitype/"/>
-    <ds:schemaRef ds:uri="http://schemas.openxmlformats.org/package/2006/metadata/core-properties"/>
-    <ds:schemaRef ds:uri="http://purl.org/dc/terms/"/>
-    <ds:schemaRef ds:uri="http://schemas.microsoft.com/office/2006/metadata/properties"/>
-    <ds:schemaRef ds:uri="http://purl.org/dc/elements/1.1/"/>
-  </ds:schemaRefs>
-</ds:datastoreItem>
-</file>
-
 <file path=customXml/itemProps3.xml><?xml version="1.0" encoding="utf-8"?>
 <ds:datastoreItem xmlns:ds="http://schemas.openxmlformats.org/officeDocument/2006/customXml" ds:itemID="{705B35A6-8B52-46A5-AE45-B98C6459DC10}">
   <ds:schemaRefs>

</xml_diff>